<commit_message>
(수정) 03. Designing Problems
(수정) 03. Designing Problems
</commit_message>
<xml_diff>
--- a/발표자료/03. Designing Problems.pptx
+++ b/발표자료/03. Designing Problems.pptx
@@ -14,24 +14,25 @@
     <p:sldId id="269" r:id="rId8"/>
     <p:sldId id="270" r:id="rId9"/>
     <p:sldId id="280" r:id="rId10"/>
-    <p:sldId id="274" r:id="rId11"/>
-    <p:sldId id="281" r:id="rId12"/>
-    <p:sldId id="278" r:id="rId13"/>
-    <p:sldId id="271" r:id="rId14"/>
-    <p:sldId id="272" r:id="rId15"/>
+    <p:sldId id="282" r:id="rId11"/>
+    <p:sldId id="274" r:id="rId12"/>
+    <p:sldId id="281" r:id="rId13"/>
+    <p:sldId id="278" r:id="rId14"/>
+    <p:sldId id="271" r:id="rId15"/>
+    <p:sldId id="272" r:id="rId16"/>
   </p:sldIdLst>
   <p:sldSz cx="12192000" cy="6858000"/>
   <p:notesSz cx="6858000" cy="9144000"/>
   <p:embeddedFontLst>
     <p:embeddedFont>
       <p:font typeface="나눔바른고딕" panose="020B0600000101010101" charset="-127"/>
-      <p:regular r:id="rId16"/>
-      <p:bold r:id="rId17"/>
+      <p:regular r:id="rId17"/>
+      <p:bold r:id="rId18"/>
     </p:embeddedFont>
     <p:embeddedFont>
       <p:font typeface="맑은 고딕" panose="020B0503020000020004" pitchFamily="50" charset="-127"/>
-      <p:regular r:id="rId18"/>
-      <p:bold r:id="rId19"/>
+      <p:regular r:id="rId19"/>
+      <p:bold r:id="rId20"/>
     </p:embeddedFont>
   </p:embeddedFontLst>
   <p:defaultTextStyle>
@@ -266,7 +267,7 @@
           <a:p>
             <a:fld id="{98304DCD-D215-46BC-93C7-0E53B41E8E47}" type="datetimeFigureOut">
               <a:rPr lang="ko-KR" altLang="en-US" smtClean="0"/>
-              <a:t>2018-11-14</a:t>
+              <a:t>2018-11-22</a:t>
             </a:fld>
             <a:endParaRPr lang="ko-KR" altLang="en-US"/>
           </a:p>
@@ -434,7 +435,7 @@
           <a:p>
             <a:fld id="{98304DCD-D215-46BC-93C7-0E53B41E8E47}" type="datetimeFigureOut">
               <a:rPr lang="ko-KR" altLang="en-US" smtClean="0"/>
-              <a:t>2018-11-14</a:t>
+              <a:t>2018-11-22</a:t>
             </a:fld>
             <a:endParaRPr lang="ko-KR" altLang="en-US"/>
           </a:p>
@@ -612,7 +613,7 @@
           <a:p>
             <a:fld id="{98304DCD-D215-46BC-93C7-0E53B41E8E47}" type="datetimeFigureOut">
               <a:rPr lang="ko-KR" altLang="en-US" smtClean="0"/>
-              <a:t>2018-11-14</a:t>
+              <a:t>2018-11-22</a:t>
             </a:fld>
             <a:endParaRPr lang="ko-KR" altLang="en-US"/>
           </a:p>
@@ -780,7 +781,7 @@
           <a:p>
             <a:fld id="{98304DCD-D215-46BC-93C7-0E53B41E8E47}" type="datetimeFigureOut">
               <a:rPr lang="ko-KR" altLang="en-US" smtClean="0"/>
-              <a:t>2018-11-14</a:t>
+              <a:t>2018-11-22</a:t>
             </a:fld>
             <a:endParaRPr lang="ko-KR" altLang="en-US"/>
           </a:p>
@@ -1025,7 +1026,7 @@
           <a:p>
             <a:fld id="{98304DCD-D215-46BC-93C7-0E53B41E8E47}" type="datetimeFigureOut">
               <a:rPr lang="ko-KR" altLang="en-US" smtClean="0"/>
-              <a:t>2018-11-14</a:t>
+              <a:t>2018-11-22</a:t>
             </a:fld>
             <a:endParaRPr lang="ko-KR" altLang="en-US"/>
           </a:p>
@@ -1254,7 +1255,7 @@
           <a:p>
             <a:fld id="{98304DCD-D215-46BC-93C7-0E53B41E8E47}" type="datetimeFigureOut">
               <a:rPr lang="ko-KR" altLang="en-US" smtClean="0"/>
-              <a:t>2018-11-14</a:t>
+              <a:t>2018-11-22</a:t>
             </a:fld>
             <a:endParaRPr lang="ko-KR" altLang="en-US"/>
           </a:p>
@@ -1618,7 +1619,7 @@
           <a:p>
             <a:fld id="{98304DCD-D215-46BC-93C7-0E53B41E8E47}" type="datetimeFigureOut">
               <a:rPr lang="ko-KR" altLang="en-US" smtClean="0"/>
-              <a:t>2018-11-14</a:t>
+              <a:t>2018-11-22</a:t>
             </a:fld>
             <a:endParaRPr lang="ko-KR" altLang="en-US"/>
           </a:p>
@@ -1735,7 +1736,7 @@
           <a:p>
             <a:fld id="{98304DCD-D215-46BC-93C7-0E53B41E8E47}" type="datetimeFigureOut">
               <a:rPr lang="ko-KR" altLang="en-US" smtClean="0"/>
-              <a:t>2018-11-14</a:t>
+              <a:t>2018-11-22</a:t>
             </a:fld>
             <a:endParaRPr lang="ko-KR" altLang="en-US"/>
           </a:p>
@@ -1830,7 +1831,7 @@
           <a:p>
             <a:fld id="{98304DCD-D215-46BC-93C7-0E53B41E8E47}" type="datetimeFigureOut">
               <a:rPr lang="ko-KR" altLang="en-US" smtClean="0"/>
-              <a:t>2018-11-14</a:t>
+              <a:t>2018-11-22</a:t>
             </a:fld>
             <a:endParaRPr lang="ko-KR" altLang="en-US"/>
           </a:p>
@@ -2105,7 +2106,7 @@
           <a:p>
             <a:fld id="{98304DCD-D215-46BC-93C7-0E53B41E8E47}" type="datetimeFigureOut">
               <a:rPr lang="ko-KR" altLang="en-US" smtClean="0"/>
-              <a:t>2018-11-14</a:t>
+              <a:t>2018-11-22</a:t>
             </a:fld>
             <a:endParaRPr lang="ko-KR" altLang="en-US"/>
           </a:p>
@@ -2357,7 +2358,7 @@
           <a:p>
             <a:fld id="{98304DCD-D215-46BC-93C7-0E53B41E8E47}" type="datetimeFigureOut">
               <a:rPr lang="ko-KR" altLang="en-US" smtClean="0"/>
-              <a:t>2018-11-14</a:t>
+              <a:t>2018-11-22</a:t>
             </a:fld>
             <a:endParaRPr lang="ko-KR" altLang="en-US"/>
           </a:p>
@@ -2568,7 +2569,7 @@
           <a:p>
             <a:fld id="{98304DCD-D215-46BC-93C7-0E53B41E8E47}" type="datetimeFigureOut">
               <a:rPr lang="ko-KR" altLang="en-US" smtClean="0"/>
-              <a:t>2018-11-14</a:t>
+              <a:t>2018-11-22</a:t>
             </a:fld>
             <a:endParaRPr lang="ko-KR" altLang="en-US"/>
           </a:p>
@@ -4158,6 +4159,4550 @@
       </p:sp>
       <p:sp>
         <p:nvSpPr>
+          <p:cNvPr id="22" name="사각형: 잘린 대각선 방향 모서리 21">
+            <a:extLst>
+              <a:ext uri="{FF2B5EF4-FFF2-40B4-BE49-F238E27FC236}">
+                <a16:creationId xmlns:a16="http://schemas.microsoft.com/office/drawing/2014/main" id="{BEBD2A5F-904E-4797-BF17-1244E19DA098}"/>
+              </a:ext>
+            </a:extLst>
+          </p:cNvPr>
+          <p:cNvSpPr/>
+          <p:nvPr/>
+        </p:nvSpPr>
+        <p:spPr>
+          <a:xfrm>
+            <a:off x="2863065" y="18659"/>
+            <a:ext cx="4495742" cy="5903100"/>
+          </a:xfrm>
+          <a:prstGeom prst="snip2DiagRect">
+            <a:avLst/>
+          </a:prstGeom>
+          <a:ln>
+            <a:solidFill>
+              <a:schemeClr val="tx1"/>
+            </a:solidFill>
+          </a:ln>
+          <a:scene3d>
+            <a:camera prst="isometricOffAxis2Top"/>
+            <a:lightRig rig="threePt" dir="t"/>
+          </a:scene3d>
+        </p:spPr>
+        <p:style>
+          <a:lnRef idx="2">
+            <a:schemeClr val="accent3"/>
+          </a:lnRef>
+          <a:fillRef idx="1">
+            <a:schemeClr val="lt1"/>
+          </a:fillRef>
+          <a:effectRef idx="0">
+            <a:schemeClr val="accent3"/>
+          </a:effectRef>
+          <a:fontRef idx="minor">
+            <a:schemeClr val="dk1"/>
+          </a:fontRef>
+        </p:style>
+        <p:txBody>
+          <a:bodyPr rtlCol="0" anchor="ctr"/>
+          <a:lstStyle/>
+          <a:p>
+            <a:pPr algn="ctr"/>
+            <a:endParaRPr lang="ko-KR" altLang="en-US"/>
+          </a:p>
+        </p:txBody>
+      </p:sp>
+      <p:sp>
+        <p:nvSpPr>
+          <p:cNvPr id="24" name="타원 23">
+            <a:extLst>
+              <a:ext uri="{FF2B5EF4-FFF2-40B4-BE49-F238E27FC236}">
+                <a16:creationId xmlns:a16="http://schemas.microsoft.com/office/drawing/2014/main" id="{871816D1-B5B6-4D8A-BDC1-FD75A9539859}"/>
+              </a:ext>
+            </a:extLst>
+          </p:cNvPr>
+          <p:cNvSpPr/>
+          <p:nvPr/>
+        </p:nvSpPr>
+        <p:spPr>
+          <a:xfrm>
+            <a:off x="5060640" y="2375430"/>
+            <a:ext cx="218114" cy="209724"/>
+          </a:xfrm>
+          <a:prstGeom prst="ellipse">
+            <a:avLst/>
+          </a:prstGeom>
+        </p:spPr>
+        <p:style>
+          <a:lnRef idx="2">
+            <a:schemeClr val="accent1">
+              <a:shade val="50000"/>
+            </a:schemeClr>
+          </a:lnRef>
+          <a:fillRef idx="1">
+            <a:schemeClr val="accent1"/>
+          </a:fillRef>
+          <a:effectRef idx="0">
+            <a:schemeClr val="accent1"/>
+          </a:effectRef>
+          <a:fontRef idx="minor">
+            <a:schemeClr val="lt1"/>
+          </a:fontRef>
+        </p:style>
+        <p:txBody>
+          <a:bodyPr rtlCol="0" anchor="ctr"/>
+          <a:lstStyle/>
+          <a:p>
+            <a:pPr algn="ctr"/>
+            <a:endParaRPr lang="ko-KR" altLang="en-US"/>
+          </a:p>
+        </p:txBody>
+      </p:sp>
+      <p:sp>
+        <p:nvSpPr>
+          <p:cNvPr id="26" name="타원 25">
+            <a:extLst>
+              <a:ext uri="{FF2B5EF4-FFF2-40B4-BE49-F238E27FC236}">
+                <a16:creationId xmlns:a16="http://schemas.microsoft.com/office/drawing/2014/main" id="{F992668C-ABEC-45B6-8108-96D2B4BF181E}"/>
+              </a:ext>
+            </a:extLst>
+          </p:cNvPr>
+          <p:cNvSpPr/>
+          <p:nvPr/>
+        </p:nvSpPr>
+        <p:spPr>
+          <a:xfrm>
+            <a:off x="3931462" y="2397925"/>
+            <a:ext cx="218114" cy="209724"/>
+          </a:xfrm>
+          <a:prstGeom prst="ellipse">
+            <a:avLst/>
+          </a:prstGeom>
+        </p:spPr>
+        <p:style>
+          <a:lnRef idx="2">
+            <a:schemeClr val="accent1">
+              <a:shade val="50000"/>
+            </a:schemeClr>
+          </a:lnRef>
+          <a:fillRef idx="1">
+            <a:schemeClr val="accent1"/>
+          </a:fillRef>
+          <a:effectRef idx="0">
+            <a:schemeClr val="accent1"/>
+          </a:effectRef>
+          <a:fontRef idx="minor">
+            <a:schemeClr val="lt1"/>
+          </a:fontRef>
+        </p:style>
+        <p:txBody>
+          <a:bodyPr rtlCol="0" anchor="ctr"/>
+          <a:lstStyle/>
+          <a:p>
+            <a:pPr algn="ctr"/>
+            <a:endParaRPr lang="ko-KR" altLang="en-US"/>
+          </a:p>
+        </p:txBody>
+      </p:sp>
+      <p:sp>
+        <p:nvSpPr>
+          <p:cNvPr id="27" name="타원 26">
+            <a:extLst>
+              <a:ext uri="{FF2B5EF4-FFF2-40B4-BE49-F238E27FC236}">
+                <a16:creationId xmlns:a16="http://schemas.microsoft.com/office/drawing/2014/main" id="{681DE2F5-4528-40E2-8544-4274AF80EE62}"/>
+              </a:ext>
+            </a:extLst>
+          </p:cNvPr>
+          <p:cNvSpPr/>
+          <p:nvPr/>
+        </p:nvSpPr>
+        <p:spPr>
+          <a:xfrm>
+            <a:off x="4809683" y="2083339"/>
+            <a:ext cx="218114" cy="209724"/>
+          </a:xfrm>
+          <a:prstGeom prst="ellipse">
+            <a:avLst/>
+          </a:prstGeom>
+        </p:spPr>
+        <p:style>
+          <a:lnRef idx="2">
+            <a:schemeClr val="accent1">
+              <a:shade val="50000"/>
+            </a:schemeClr>
+          </a:lnRef>
+          <a:fillRef idx="1">
+            <a:schemeClr val="accent1"/>
+          </a:fillRef>
+          <a:effectRef idx="0">
+            <a:schemeClr val="accent1"/>
+          </a:effectRef>
+          <a:fontRef idx="minor">
+            <a:schemeClr val="lt1"/>
+          </a:fontRef>
+        </p:style>
+        <p:txBody>
+          <a:bodyPr rtlCol="0" anchor="ctr"/>
+          <a:lstStyle/>
+          <a:p>
+            <a:pPr algn="ctr"/>
+            <a:endParaRPr lang="ko-KR" altLang="en-US"/>
+          </a:p>
+        </p:txBody>
+      </p:sp>
+      <p:sp>
+        <p:nvSpPr>
+          <p:cNvPr id="31" name="타원 30">
+            <a:extLst>
+              <a:ext uri="{FF2B5EF4-FFF2-40B4-BE49-F238E27FC236}">
+                <a16:creationId xmlns:a16="http://schemas.microsoft.com/office/drawing/2014/main" id="{CED22FDE-4ABE-47C9-BF54-BB0F7A188EB9}"/>
+              </a:ext>
+            </a:extLst>
+          </p:cNvPr>
+          <p:cNvSpPr/>
+          <p:nvPr/>
+        </p:nvSpPr>
+        <p:spPr>
+          <a:xfrm>
+            <a:off x="4485315" y="2348660"/>
+            <a:ext cx="298266" cy="308254"/>
+          </a:xfrm>
+          <a:prstGeom prst="ellipse">
+            <a:avLst/>
+          </a:prstGeom>
+          <a:solidFill>
+            <a:srgbClr val="FFC000"/>
+          </a:solidFill>
+        </p:spPr>
+        <p:style>
+          <a:lnRef idx="2">
+            <a:schemeClr val="accent1">
+              <a:shade val="50000"/>
+            </a:schemeClr>
+          </a:lnRef>
+          <a:fillRef idx="1">
+            <a:schemeClr val="accent1"/>
+          </a:fillRef>
+          <a:effectRef idx="0">
+            <a:schemeClr val="accent1"/>
+          </a:effectRef>
+          <a:fontRef idx="minor">
+            <a:schemeClr val="lt1"/>
+          </a:fontRef>
+        </p:style>
+        <p:txBody>
+          <a:bodyPr rtlCol="0" anchor="ctr"/>
+          <a:lstStyle/>
+          <a:p>
+            <a:pPr algn="ctr"/>
+            <a:r>
+              <a:rPr lang="en-US" altLang="ko-KR" dirty="0"/>
+              <a:t>A</a:t>
+            </a:r>
+            <a:endParaRPr lang="ko-KR" altLang="en-US" dirty="0"/>
+          </a:p>
+        </p:txBody>
+      </p:sp>
+      <p:cxnSp>
+        <p:nvCxnSpPr>
+          <p:cNvPr id="35" name="직선 연결선 34">
+            <a:extLst>
+              <a:ext uri="{FF2B5EF4-FFF2-40B4-BE49-F238E27FC236}">
+                <a16:creationId xmlns:a16="http://schemas.microsoft.com/office/drawing/2014/main" id="{81367502-B7D2-482E-9ED5-272EEAF62070}"/>
+              </a:ext>
+            </a:extLst>
+          </p:cNvPr>
+          <p:cNvCxnSpPr>
+            <a:cxnSpLocks/>
+            <a:stCxn id="26" idx="6"/>
+            <a:endCxn id="31" idx="2"/>
+          </p:cNvCxnSpPr>
+          <p:nvPr/>
+        </p:nvCxnSpPr>
+        <p:spPr>
+          <a:xfrm>
+            <a:off x="4149576" y="2502787"/>
+            <a:ext cx="335739" cy="0"/>
+          </a:xfrm>
+          <a:prstGeom prst="line">
+            <a:avLst/>
+          </a:prstGeom>
+          <a:ln>
+            <a:solidFill>
+              <a:schemeClr val="tx1"/>
+            </a:solidFill>
+          </a:ln>
+        </p:spPr>
+        <p:style>
+          <a:lnRef idx="1">
+            <a:schemeClr val="accent1"/>
+          </a:lnRef>
+          <a:fillRef idx="0">
+            <a:schemeClr val="accent1"/>
+          </a:fillRef>
+          <a:effectRef idx="0">
+            <a:schemeClr val="accent1"/>
+          </a:effectRef>
+          <a:fontRef idx="minor">
+            <a:schemeClr val="tx1"/>
+          </a:fontRef>
+        </p:style>
+      </p:cxnSp>
+      <p:cxnSp>
+        <p:nvCxnSpPr>
+          <p:cNvPr id="36" name="직선 연결선 35">
+            <a:extLst>
+              <a:ext uri="{FF2B5EF4-FFF2-40B4-BE49-F238E27FC236}">
+                <a16:creationId xmlns:a16="http://schemas.microsoft.com/office/drawing/2014/main" id="{A3DDFB60-1CEA-4D1C-BEDB-86A96641763A}"/>
+              </a:ext>
+            </a:extLst>
+          </p:cNvPr>
+          <p:cNvCxnSpPr>
+            <a:cxnSpLocks/>
+            <a:stCxn id="31" idx="7"/>
+            <a:endCxn id="27" idx="3"/>
+          </p:cNvCxnSpPr>
+          <p:nvPr/>
+        </p:nvCxnSpPr>
+        <p:spPr>
+          <a:xfrm flipV="1">
+            <a:off x="4739901" y="2262350"/>
+            <a:ext cx="101724" cy="131453"/>
+          </a:xfrm>
+          <a:prstGeom prst="line">
+            <a:avLst/>
+          </a:prstGeom>
+          <a:ln>
+            <a:solidFill>
+              <a:schemeClr val="tx1"/>
+            </a:solidFill>
+          </a:ln>
+        </p:spPr>
+        <p:style>
+          <a:lnRef idx="1">
+            <a:schemeClr val="accent1"/>
+          </a:lnRef>
+          <a:fillRef idx="0">
+            <a:schemeClr val="accent1"/>
+          </a:fillRef>
+          <a:effectRef idx="0">
+            <a:schemeClr val="accent1"/>
+          </a:effectRef>
+          <a:fontRef idx="minor">
+            <a:schemeClr val="tx1"/>
+          </a:fontRef>
+        </p:style>
+      </p:cxnSp>
+      <p:cxnSp>
+        <p:nvCxnSpPr>
+          <p:cNvPr id="39" name="직선 연결선 38">
+            <a:extLst>
+              <a:ext uri="{FF2B5EF4-FFF2-40B4-BE49-F238E27FC236}">
+                <a16:creationId xmlns:a16="http://schemas.microsoft.com/office/drawing/2014/main" id="{3B873737-51AF-4B2F-96D4-403D1CB18C26}"/>
+              </a:ext>
+            </a:extLst>
+          </p:cNvPr>
+          <p:cNvCxnSpPr>
+            <a:cxnSpLocks/>
+            <a:stCxn id="31" idx="6"/>
+            <a:endCxn id="24" idx="2"/>
+          </p:cNvCxnSpPr>
+          <p:nvPr/>
+        </p:nvCxnSpPr>
+        <p:spPr>
+          <a:xfrm flipV="1">
+            <a:off x="4783581" y="2480292"/>
+            <a:ext cx="277059" cy="22495"/>
+          </a:xfrm>
+          <a:prstGeom prst="line">
+            <a:avLst/>
+          </a:prstGeom>
+          <a:ln>
+            <a:solidFill>
+              <a:schemeClr val="tx1"/>
+            </a:solidFill>
+          </a:ln>
+        </p:spPr>
+        <p:style>
+          <a:lnRef idx="1">
+            <a:schemeClr val="accent1"/>
+          </a:lnRef>
+          <a:fillRef idx="0">
+            <a:schemeClr val="accent1"/>
+          </a:fillRef>
+          <a:effectRef idx="0">
+            <a:schemeClr val="accent1"/>
+          </a:effectRef>
+          <a:fontRef idx="minor">
+            <a:schemeClr val="tx1"/>
+          </a:fontRef>
+        </p:style>
+      </p:cxnSp>
+      <p:sp>
+        <p:nvSpPr>
+          <p:cNvPr id="67" name="TextBox 66">
+            <a:extLst>
+              <a:ext uri="{FF2B5EF4-FFF2-40B4-BE49-F238E27FC236}">
+                <a16:creationId xmlns:a16="http://schemas.microsoft.com/office/drawing/2014/main" id="{B008C8D8-C90E-49E9-B9B7-214619AB715F}"/>
+              </a:ext>
+            </a:extLst>
+          </p:cNvPr>
+          <p:cNvSpPr txBox="1"/>
+          <p:nvPr/>
+        </p:nvSpPr>
+        <p:spPr>
+          <a:xfrm>
+            <a:off x="6989671" y="2452615"/>
+            <a:ext cx="905522" cy="369332"/>
+          </a:xfrm>
+          <a:prstGeom prst="rect">
+            <a:avLst/>
+          </a:prstGeom>
+          <a:noFill/>
+        </p:spPr>
+        <p:txBody>
+          <a:bodyPr wrap="square" rtlCol="0">
+            <a:spAutoFit/>
+          </a:bodyPr>
+          <a:lstStyle/>
+          <a:p>
+            <a:pPr algn="ctr"/>
+            <a:r>
+              <a:rPr lang="en-US" altLang="ko-KR" dirty="0"/>
+              <a:t>2F</a:t>
+            </a:r>
+            <a:endParaRPr lang="ko-KR" altLang="en-US" dirty="0"/>
+          </a:p>
+        </p:txBody>
+      </p:sp>
+      <p:sp>
+        <p:nvSpPr>
+          <p:cNvPr id="68" name="타원 67">
+            <a:extLst>
+              <a:ext uri="{FF2B5EF4-FFF2-40B4-BE49-F238E27FC236}">
+                <a16:creationId xmlns:a16="http://schemas.microsoft.com/office/drawing/2014/main" id="{59091DE6-465E-440F-966A-17FBB9D583D8}"/>
+              </a:ext>
+            </a:extLst>
+          </p:cNvPr>
+          <p:cNvSpPr/>
+          <p:nvPr/>
+        </p:nvSpPr>
+        <p:spPr>
+          <a:xfrm>
+            <a:off x="8578475" y="1059503"/>
+            <a:ext cx="218114" cy="209724"/>
+          </a:xfrm>
+          <a:prstGeom prst="ellipse">
+            <a:avLst/>
+          </a:prstGeom>
+        </p:spPr>
+        <p:style>
+          <a:lnRef idx="2">
+            <a:schemeClr val="accent1">
+              <a:shade val="50000"/>
+            </a:schemeClr>
+          </a:lnRef>
+          <a:fillRef idx="1">
+            <a:schemeClr val="accent1"/>
+          </a:fillRef>
+          <a:effectRef idx="0">
+            <a:schemeClr val="accent1"/>
+          </a:effectRef>
+          <a:fontRef idx="minor">
+            <a:schemeClr val="lt1"/>
+          </a:fontRef>
+        </p:style>
+        <p:txBody>
+          <a:bodyPr rtlCol="0" anchor="ctr"/>
+          <a:lstStyle/>
+          <a:p>
+            <a:pPr algn="ctr"/>
+            <a:endParaRPr lang="ko-KR" altLang="en-US"/>
+          </a:p>
+        </p:txBody>
+      </p:sp>
+      <p:sp>
+        <p:nvSpPr>
+          <p:cNvPr id="69" name="TextBox 68">
+            <a:extLst>
+              <a:ext uri="{FF2B5EF4-FFF2-40B4-BE49-F238E27FC236}">
+                <a16:creationId xmlns:a16="http://schemas.microsoft.com/office/drawing/2014/main" id="{A656117B-2C46-4E46-BB4E-C2A409E9ED5F}"/>
+              </a:ext>
+            </a:extLst>
+          </p:cNvPr>
+          <p:cNvSpPr txBox="1"/>
+          <p:nvPr/>
+        </p:nvSpPr>
+        <p:spPr>
+          <a:xfrm>
+            <a:off x="8392949" y="951446"/>
+            <a:ext cx="3067383" cy="1477328"/>
+          </a:xfrm>
+          <a:prstGeom prst="rect">
+            <a:avLst/>
+          </a:prstGeom>
+          <a:noFill/>
+          <a:ln>
+            <a:solidFill>
+              <a:schemeClr val="tx1"/>
+            </a:solidFill>
+          </a:ln>
+        </p:spPr>
+        <p:txBody>
+          <a:bodyPr wrap="square" rtlCol="0">
+            <a:spAutoFit/>
+          </a:bodyPr>
+          <a:lstStyle/>
+          <a:p>
+            <a:r>
+              <a:rPr lang="en-US" altLang="ko-KR" dirty="0"/>
+              <a:t>      : </a:t>
+            </a:r>
+            <a:r>
+              <a:rPr lang="ko-KR" altLang="en-US" dirty="0"/>
+              <a:t>그냥 장소</a:t>
+            </a:r>
+            <a:endParaRPr lang="en-US" altLang="ko-KR" dirty="0"/>
+          </a:p>
+          <a:p>
+            <a:endParaRPr lang="en-US" altLang="ko-KR" dirty="0"/>
+          </a:p>
+          <a:p>
+            <a:r>
+              <a:rPr lang="en-US" altLang="ko-KR" dirty="0"/>
+              <a:t>      : </a:t>
+            </a:r>
+            <a:r>
+              <a:rPr lang="ko-KR" altLang="en-US" dirty="0"/>
+              <a:t>층간 이동 가능 장소</a:t>
+            </a:r>
+            <a:endParaRPr lang="en-US" altLang="ko-KR" dirty="0"/>
+          </a:p>
+          <a:p>
+            <a:endParaRPr lang="en-US" altLang="ko-KR" dirty="0"/>
+          </a:p>
+          <a:p>
+            <a:r>
+              <a:rPr lang="en-US" altLang="ko-KR" dirty="0"/>
+              <a:t>      : </a:t>
+            </a:r>
+            <a:r>
+              <a:rPr lang="ko-KR" altLang="en-US" dirty="0"/>
+              <a:t>장소 사이 소요 시간</a:t>
+            </a:r>
+          </a:p>
+        </p:txBody>
+      </p:sp>
+      <p:sp>
+        <p:nvSpPr>
+          <p:cNvPr id="70" name="타원 69">
+            <a:extLst>
+              <a:ext uri="{FF2B5EF4-FFF2-40B4-BE49-F238E27FC236}">
+                <a16:creationId xmlns:a16="http://schemas.microsoft.com/office/drawing/2014/main" id="{F404C913-9CAF-4AAB-8F18-6ACDEA4D7BCD}"/>
+              </a:ext>
+            </a:extLst>
+          </p:cNvPr>
+          <p:cNvSpPr/>
+          <p:nvPr/>
+        </p:nvSpPr>
+        <p:spPr>
+          <a:xfrm>
+            <a:off x="8578475" y="1601791"/>
+            <a:ext cx="218114" cy="209724"/>
+          </a:xfrm>
+          <a:prstGeom prst="ellipse">
+            <a:avLst/>
+          </a:prstGeom>
+          <a:solidFill>
+            <a:srgbClr val="FFC000"/>
+          </a:solidFill>
+        </p:spPr>
+        <p:style>
+          <a:lnRef idx="2">
+            <a:schemeClr val="accent1">
+              <a:shade val="50000"/>
+            </a:schemeClr>
+          </a:lnRef>
+          <a:fillRef idx="1">
+            <a:schemeClr val="accent1"/>
+          </a:fillRef>
+          <a:effectRef idx="0">
+            <a:schemeClr val="accent1"/>
+          </a:effectRef>
+          <a:fontRef idx="minor">
+            <a:schemeClr val="lt1"/>
+          </a:fontRef>
+        </p:style>
+        <p:txBody>
+          <a:bodyPr rtlCol="0" anchor="ctr"/>
+          <a:lstStyle/>
+          <a:p>
+            <a:pPr algn="ctr"/>
+            <a:endParaRPr lang="ko-KR" altLang="en-US"/>
+          </a:p>
+        </p:txBody>
+      </p:sp>
+      <p:cxnSp>
+        <p:nvCxnSpPr>
+          <p:cNvPr id="71" name="직선 연결선 70">
+            <a:extLst>
+              <a:ext uri="{FF2B5EF4-FFF2-40B4-BE49-F238E27FC236}">
+                <a16:creationId xmlns:a16="http://schemas.microsoft.com/office/drawing/2014/main" id="{BA0C4977-0917-4918-9F96-7B9C0C562359}"/>
+              </a:ext>
+            </a:extLst>
+          </p:cNvPr>
+          <p:cNvCxnSpPr>
+            <a:cxnSpLocks/>
+          </p:cNvCxnSpPr>
+          <p:nvPr/>
+        </p:nvCxnSpPr>
+        <p:spPr>
+          <a:xfrm flipV="1">
+            <a:off x="8565161" y="2126323"/>
+            <a:ext cx="258062" cy="249107"/>
+          </a:xfrm>
+          <a:prstGeom prst="line">
+            <a:avLst/>
+          </a:prstGeom>
+          <a:ln>
+            <a:solidFill>
+              <a:schemeClr val="tx1"/>
+            </a:solidFill>
+          </a:ln>
+        </p:spPr>
+        <p:style>
+          <a:lnRef idx="1">
+            <a:schemeClr val="accent1"/>
+          </a:lnRef>
+          <a:fillRef idx="0">
+            <a:schemeClr val="accent1"/>
+          </a:fillRef>
+          <a:effectRef idx="0">
+            <a:schemeClr val="accent1"/>
+          </a:effectRef>
+          <a:fontRef idx="minor">
+            <a:schemeClr val="tx1"/>
+          </a:fontRef>
+        </p:style>
+      </p:cxnSp>
+      <p:sp>
+        <p:nvSpPr>
+          <p:cNvPr id="72" name="직사각형 71">
+            <a:extLst>
+              <a:ext uri="{FF2B5EF4-FFF2-40B4-BE49-F238E27FC236}">
+                <a16:creationId xmlns:a16="http://schemas.microsoft.com/office/drawing/2014/main" id="{F5EA0CE1-857A-4032-87ED-725F9DF38BED}"/>
+              </a:ext>
+            </a:extLst>
+          </p:cNvPr>
+          <p:cNvSpPr/>
+          <p:nvPr/>
+        </p:nvSpPr>
+        <p:spPr>
+          <a:xfrm>
+            <a:off x="21926" y="4317711"/>
+            <a:ext cx="1598515" cy="230832"/>
+          </a:xfrm>
+          <a:prstGeom prst="rect">
+            <a:avLst/>
+          </a:prstGeom>
+        </p:spPr>
+        <p:txBody>
+          <a:bodyPr wrap="none">
+            <a:spAutoFit/>
+          </a:bodyPr>
+          <a:lstStyle/>
+          <a:p>
+            <a:r>
+              <a:rPr lang="en-US" altLang="ko-KR" sz="900" dirty="0">
+                <a:solidFill>
+                  <a:srgbClr val="BFBFBF"/>
+                </a:solidFill>
+                <a:latin typeface="+mj-lt"/>
+              </a:rPr>
+              <a:t>Precondition &amp; Calculation</a:t>
+            </a:r>
+            <a:endParaRPr lang="ko-KR" altLang="en-US" sz="900" dirty="0">
+              <a:solidFill>
+                <a:srgbClr val="BFBFBF"/>
+              </a:solidFill>
+              <a:latin typeface="+mj-lt"/>
+            </a:endParaRPr>
+          </a:p>
+        </p:txBody>
+      </p:sp>
+      <p:sp>
+        <p:nvSpPr>
+          <p:cNvPr id="85" name="타원 84">
+            <a:extLst>
+              <a:ext uri="{FF2B5EF4-FFF2-40B4-BE49-F238E27FC236}">
+                <a16:creationId xmlns:a16="http://schemas.microsoft.com/office/drawing/2014/main" id="{7EDF5C3B-0DF4-49D8-987F-5914E012E761}"/>
+              </a:ext>
+            </a:extLst>
+          </p:cNvPr>
+          <p:cNvSpPr/>
+          <p:nvPr/>
+        </p:nvSpPr>
+        <p:spPr>
+          <a:xfrm>
+            <a:off x="4196885" y="2083339"/>
+            <a:ext cx="218114" cy="209724"/>
+          </a:xfrm>
+          <a:prstGeom prst="ellipse">
+            <a:avLst/>
+          </a:prstGeom>
+        </p:spPr>
+        <p:style>
+          <a:lnRef idx="2">
+            <a:schemeClr val="accent1">
+              <a:shade val="50000"/>
+            </a:schemeClr>
+          </a:lnRef>
+          <a:fillRef idx="1">
+            <a:schemeClr val="accent1"/>
+          </a:fillRef>
+          <a:effectRef idx="0">
+            <a:schemeClr val="accent1"/>
+          </a:effectRef>
+          <a:fontRef idx="minor">
+            <a:schemeClr val="lt1"/>
+          </a:fontRef>
+        </p:style>
+        <p:txBody>
+          <a:bodyPr rtlCol="0" anchor="ctr"/>
+          <a:lstStyle/>
+          <a:p>
+            <a:pPr algn="ctr"/>
+            <a:endParaRPr lang="ko-KR" altLang="en-US"/>
+          </a:p>
+        </p:txBody>
+      </p:sp>
+      <p:cxnSp>
+        <p:nvCxnSpPr>
+          <p:cNvPr id="86" name="직선 연결선 85">
+            <a:extLst>
+              <a:ext uri="{FF2B5EF4-FFF2-40B4-BE49-F238E27FC236}">
+                <a16:creationId xmlns:a16="http://schemas.microsoft.com/office/drawing/2014/main" id="{C0E6B504-729E-4B49-BC83-C6DCC1A88DD5}"/>
+              </a:ext>
+            </a:extLst>
+          </p:cNvPr>
+          <p:cNvCxnSpPr>
+            <a:cxnSpLocks/>
+            <a:stCxn id="85" idx="5"/>
+            <a:endCxn id="31" idx="1"/>
+          </p:cNvCxnSpPr>
+          <p:nvPr/>
+        </p:nvCxnSpPr>
+        <p:spPr>
+          <a:xfrm>
+            <a:off x="4383057" y="2262350"/>
+            <a:ext cx="145938" cy="131453"/>
+          </a:xfrm>
+          <a:prstGeom prst="line">
+            <a:avLst/>
+          </a:prstGeom>
+          <a:ln>
+            <a:solidFill>
+              <a:schemeClr val="tx1"/>
+            </a:solidFill>
+          </a:ln>
+        </p:spPr>
+        <p:style>
+          <a:lnRef idx="1">
+            <a:schemeClr val="accent1"/>
+          </a:lnRef>
+          <a:fillRef idx="0">
+            <a:schemeClr val="accent1"/>
+          </a:fillRef>
+          <a:effectRef idx="0">
+            <a:schemeClr val="accent1"/>
+          </a:effectRef>
+          <a:fontRef idx="minor">
+            <a:schemeClr val="tx1"/>
+          </a:fontRef>
+        </p:style>
+      </p:cxnSp>
+      <p:sp>
+        <p:nvSpPr>
+          <p:cNvPr id="100" name="타원 99">
+            <a:extLst>
+              <a:ext uri="{FF2B5EF4-FFF2-40B4-BE49-F238E27FC236}">
+                <a16:creationId xmlns:a16="http://schemas.microsoft.com/office/drawing/2014/main" id="{9ECFFA89-A64A-4456-A29E-21C3FE60CDB0}"/>
+              </a:ext>
+            </a:extLst>
+          </p:cNvPr>
+          <p:cNvSpPr/>
+          <p:nvPr/>
+        </p:nvSpPr>
+        <p:spPr>
+          <a:xfrm>
+            <a:off x="4164943" y="2713825"/>
+            <a:ext cx="218114" cy="209724"/>
+          </a:xfrm>
+          <a:prstGeom prst="ellipse">
+            <a:avLst/>
+          </a:prstGeom>
+        </p:spPr>
+        <p:style>
+          <a:lnRef idx="2">
+            <a:schemeClr val="accent1">
+              <a:shade val="50000"/>
+            </a:schemeClr>
+          </a:lnRef>
+          <a:fillRef idx="1">
+            <a:schemeClr val="accent1"/>
+          </a:fillRef>
+          <a:effectRef idx="0">
+            <a:schemeClr val="accent1"/>
+          </a:effectRef>
+          <a:fontRef idx="minor">
+            <a:schemeClr val="lt1"/>
+          </a:fontRef>
+        </p:style>
+        <p:txBody>
+          <a:bodyPr rtlCol="0" anchor="ctr"/>
+          <a:lstStyle/>
+          <a:p>
+            <a:pPr algn="ctr"/>
+            <a:endParaRPr lang="ko-KR" altLang="en-US"/>
+          </a:p>
+        </p:txBody>
+      </p:sp>
+      <p:cxnSp>
+        <p:nvCxnSpPr>
+          <p:cNvPr id="101" name="직선 연결선 100">
+            <a:extLst>
+              <a:ext uri="{FF2B5EF4-FFF2-40B4-BE49-F238E27FC236}">
+                <a16:creationId xmlns:a16="http://schemas.microsoft.com/office/drawing/2014/main" id="{FE6BE33C-99FA-4C21-8E87-2EFFE8D1A836}"/>
+              </a:ext>
+            </a:extLst>
+          </p:cNvPr>
+          <p:cNvCxnSpPr>
+            <a:cxnSpLocks/>
+            <a:stCxn id="100" idx="7"/>
+            <a:endCxn id="31" idx="3"/>
+          </p:cNvCxnSpPr>
+          <p:nvPr/>
+        </p:nvCxnSpPr>
+        <p:spPr>
+          <a:xfrm flipV="1">
+            <a:off x="4351115" y="2611771"/>
+            <a:ext cx="177880" cy="132767"/>
+          </a:xfrm>
+          <a:prstGeom prst="line">
+            <a:avLst/>
+          </a:prstGeom>
+          <a:ln>
+            <a:solidFill>
+              <a:schemeClr val="tx1"/>
+            </a:solidFill>
+          </a:ln>
+        </p:spPr>
+        <p:style>
+          <a:lnRef idx="1">
+            <a:schemeClr val="accent1"/>
+          </a:lnRef>
+          <a:fillRef idx="0">
+            <a:schemeClr val="accent1"/>
+          </a:fillRef>
+          <a:effectRef idx="0">
+            <a:schemeClr val="accent1"/>
+          </a:effectRef>
+          <a:fontRef idx="minor">
+            <a:schemeClr val="tx1"/>
+          </a:fontRef>
+        </p:style>
+      </p:cxnSp>
+      <p:sp>
+        <p:nvSpPr>
+          <p:cNvPr id="108" name="타원 107">
+            <a:extLst>
+              <a:ext uri="{FF2B5EF4-FFF2-40B4-BE49-F238E27FC236}">
+                <a16:creationId xmlns:a16="http://schemas.microsoft.com/office/drawing/2014/main" id="{5C6335AF-DD9C-4852-AC59-6C98C2575D19}"/>
+              </a:ext>
+            </a:extLst>
+          </p:cNvPr>
+          <p:cNvSpPr/>
+          <p:nvPr/>
+        </p:nvSpPr>
+        <p:spPr>
+          <a:xfrm>
+            <a:off x="4842526" y="2713825"/>
+            <a:ext cx="218114" cy="209724"/>
+          </a:xfrm>
+          <a:prstGeom prst="ellipse">
+            <a:avLst/>
+          </a:prstGeom>
+        </p:spPr>
+        <p:style>
+          <a:lnRef idx="2">
+            <a:schemeClr val="accent1">
+              <a:shade val="50000"/>
+            </a:schemeClr>
+          </a:lnRef>
+          <a:fillRef idx="1">
+            <a:schemeClr val="accent1"/>
+          </a:fillRef>
+          <a:effectRef idx="0">
+            <a:schemeClr val="accent1"/>
+          </a:effectRef>
+          <a:fontRef idx="minor">
+            <a:schemeClr val="lt1"/>
+          </a:fontRef>
+        </p:style>
+        <p:txBody>
+          <a:bodyPr rtlCol="0" anchor="ctr"/>
+          <a:lstStyle/>
+          <a:p>
+            <a:pPr algn="ctr"/>
+            <a:endParaRPr lang="ko-KR" altLang="en-US"/>
+          </a:p>
+        </p:txBody>
+      </p:sp>
+      <p:cxnSp>
+        <p:nvCxnSpPr>
+          <p:cNvPr id="109" name="직선 연결선 108">
+            <a:extLst>
+              <a:ext uri="{FF2B5EF4-FFF2-40B4-BE49-F238E27FC236}">
+                <a16:creationId xmlns:a16="http://schemas.microsoft.com/office/drawing/2014/main" id="{76C1BA09-16FA-4B9A-BC01-8ABEA5E38854}"/>
+              </a:ext>
+            </a:extLst>
+          </p:cNvPr>
+          <p:cNvCxnSpPr>
+            <a:cxnSpLocks/>
+            <a:stCxn id="108" idx="1"/>
+            <a:endCxn id="31" idx="5"/>
+          </p:cNvCxnSpPr>
+          <p:nvPr/>
+        </p:nvCxnSpPr>
+        <p:spPr>
+          <a:xfrm flipH="1" flipV="1">
+            <a:off x="4739901" y="2611771"/>
+            <a:ext cx="134567" cy="132767"/>
+          </a:xfrm>
+          <a:prstGeom prst="line">
+            <a:avLst/>
+          </a:prstGeom>
+          <a:ln>
+            <a:solidFill>
+              <a:schemeClr val="tx1"/>
+            </a:solidFill>
+          </a:ln>
+        </p:spPr>
+        <p:style>
+          <a:lnRef idx="1">
+            <a:schemeClr val="accent1"/>
+          </a:lnRef>
+          <a:fillRef idx="0">
+            <a:schemeClr val="accent1"/>
+          </a:fillRef>
+          <a:effectRef idx="0">
+            <a:schemeClr val="accent1"/>
+          </a:effectRef>
+          <a:fontRef idx="minor">
+            <a:schemeClr val="tx1"/>
+          </a:fontRef>
+        </p:style>
+      </p:cxnSp>
+      <p:sp>
+        <p:nvSpPr>
+          <p:cNvPr id="124" name="타원 123">
+            <a:extLst>
+              <a:ext uri="{FF2B5EF4-FFF2-40B4-BE49-F238E27FC236}">
+                <a16:creationId xmlns:a16="http://schemas.microsoft.com/office/drawing/2014/main" id="{9C73987F-E174-4D76-8688-93DD2D13CF1A}"/>
+              </a:ext>
+            </a:extLst>
+          </p:cNvPr>
+          <p:cNvSpPr/>
+          <p:nvPr/>
+        </p:nvSpPr>
+        <p:spPr>
+          <a:xfrm>
+            <a:off x="4605797" y="3205835"/>
+            <a:ext cx="298266" cy="308254"/>
+          </a:xfrm>
+          <a:prstGeom prst="ellipse">
+            <a:avLst/>
+          </a:prstGeom>
+          <a:solidFill>
+            <a:srgbClr val="FFC000"/>
+          </a:solidFill>
+        </p:spPr>
+        <p:style>
+          <a:lnRef idx="2">
+            <a:schemeClr val="accent1">
+              <a:shade val="50000"/>
+            </a:schemeClr>
+          </a:lnRef>
+          <a:fillRef idx="1">
+            <a:schemeClr val="accent1"/>
+          </a:fillRef>
+          <a:effectRef idx="0">
+            <a:schemeClr val="accent1"/>
+          </a:effectRef>
+          <a:fontRef idx="minor">
+            <a:schemeClr val="lt1"/>
+          </a:fontRef>
+        </p:style>
+        <p:txBody>
+          <a:bodyPr rtlCol="0" anchor="ctr"/>
+          <a:lstStyle/>
+          <a:p>
+            <a:pPr algn="ctr"/>
+            <a:r>
+              <a:rPr lang="en-US" altLang="ko-KR" dirty="0"/>
+              <a:t>B</a:t>
+            </a:r>
+            <a:endParaRPr lang="ko-KR" altLang="en-US" dirty="0"/>
+          </a:p>
+        </p:txBody>
+      </p:sp>
+      <p:cxnSp>
+        <p:nvCxnSpPr>
+          <p:cNvPr id="125" name="직선 연결선 124">
+            <a:extLst>
+              <a:ext uri="{FF2B5EF4-FFF2-40B4-BE49-F238E27FC236}">
+                <a16:creationId xmlns:a16="http://schemas.microsoft.com/office/drawing/2014/main" id="{AD309720-D877-4480-8B50-1CBCA63E8F82}"/>
+              </a:ext>
+            </a:extLst>
+          </p:cNvPr>
+          <p:cNvCxnSpPr>
+            <a:cxnSpLocks/>
+            <a:stCxn id="124" idx="0"/>
+            <a:endCxn id="31" idx="4"/>
+          </p:cNvCxnSpPr>
+          <p:nvPr/>
+        </p:nvCxnSpPr>
+        <p:spPr>
+          <a:xfrm flipH="1" flipV="1">
+            <a:off x="4634448" y="2656914"/>
+            <a:ext cx="120482" cy="548921"/>
+          </a:xfrm>
+          <a:prstGeom prst="line">
+            <a:avLst/>
+          </a:prstGeom>
+          <a:ln>
+            <a:solidFill>
+              <a:schemeClr val="tx1"/>
+            </a:solidFill>
+          </a:ln>
+        </p:spPr>
+        <p:style>
+          <a:lnRef idx="1">
+            <a:schemeClr val="accent1"/>
+          </a:lnRef>
+          <a:fillRef idx="0">
+            <a:schemeClr val="accent1"/>
+          </a:fillRef>
+          <a:effectRef idx="0">
+            <a:schemeClr val="accent1"/>
+          </a:effectRef>
+          <a:fontRef idx="minor">
+            <a:schemeClr val="tx1"/>
+          </a:fontRef>
+        </p:style>
+      </p:cxnSp>
+      <p:sp>
+        <p:nvSpPr>
+          <p:cNvPr id="129" name="타원 128">
+            <a:extLst>
+              <a:ext uri="{FF2B5EF4-FFF2-40B4-BE49-F238E27FC236}">
+                <a16:creationId xmlns:a16="http://schemas.microsoft.com/office/drawing/2014/main" id="{1650A4E7-EA88-4A90-90EE-B760315440D6}"/>
+              </a:ext>
+            </a:extLst>
+          </p:cNvPr>
+          <p:cNvSpPr/>
+          <p:nvPr/>
+        </p:nvSpPr>
+        <p:spPr>
+          <a:xfrm>
+            <a:off x="5060640" y="3535621"/>
+            <a:ext cx="218114" cy="209724"/>
+          </a:xfrm>
+          <a:prstGeom prst="ellipse">
+            <a:avLst/>
+          </a:prstGeom>
+        </p:spPr>
+        <p:style>
+          <a:lnRef idx="2">
+            <a:schemeClr val="accent1">
+              <a:shade val="50000"/>
+            </a:schemeClr>
+          </a:lnRef>
+          <a:fillRef idx="1">
+            <a:schemeClr val="accent1"/>
+          </a:fillRef>
+          <a:effectRef idx="0">
+            <a:schemeClr val="accent1"/>
+          </a:effectRef>
+          <a:fontRef idx="minor">
+            <a:schemeClr val="lt1"/>
+          </a:fontRef>
+        </p:style>
+        <p:txBody>
+          <a:bodyPr rtlCol="0" anchor="ctr"/>
+          <a:lstStyle/>
+          <a:p>
+            <a:pPr algn="ctr"/>
+            <a:endParaRPr lang="ko-KR" altLang="en-US"/>
+          </a:p>
+        </p:txBody>
+      </p:sp>
+      <p:cxnSp>
+        <p:nvCxnSpPr>
+          <p:cNvPr id="130" name="직선 연결선 129">
+            <a:extLst>
+              <a:ext uri="{FF2B5EF4-FFF2-40B4-BE49-F238E27FC236}">
+                <a16:creationId xmlns:a16="http://schemas.microsoft.com/office/drawing/2014/main" id="{B49C9D36-1F8D-4C58-9139-1D75594C7054}"/>
+              </a:ext>
+            </a:extLst>
+          </p:cNvPr>
+          <p:cNvCxnSpPr>
+            <a:cxnSpLocks/>
+            <a:stCxn id="129" idx="1"/>
+            <a:endCxn id="124" idx="5"/>
+          </p:cNvCxnSpPr>
+          <p:nvPr/>
+        </p:nvCxnSpPr>
+        <p:spPr>
+          <a:xfrm flipH="1" flipV="1">
+            <a:off x="4860383" y="3468946"/>
+            <a:ext cx="232199" cy="97388"/>
+          </a:xfrm>
+          <a:prstGeom prst="line">
+            <a:avLst/>
+          </a:prstGeom>
+          <a:ln>
+            <a:solidFill>
+              <a:schemeClr val="tx1"/>
+            </a:solidFill>
+          </a:ln>
+        </p:spPr>
+        <p:style>
+          <a:lnRef idx="1">
+            <a:schemeClr val="accent1"/>
+          </a:lnRef>
+          <a:fillRef idx="0">
+            <a:schemeClr val="accent1"/>
+          </a:fillRef>
+          <a:effectRef idx="0">
+            <a:schemeClr val="accent1"/>
+          </a:effectRef>
+          <a:fontRef idx="minor">
+            <a:schemeClr val="tx1"/>
+          </a:fontRef>
+        </p:style>
+      </p:cxnSp>
+      <p:sp>
+        <p:nvSpPr>
+          <p:cNvPr id="132" name="타원 131">
+            <a:extLst>
+              <a:ext uri="{FF2B5EF4-FFF2-40B4-BE49-F238E27FC236}">
+                <a16:creationId xmlns:a16="http://schemas.microsoft.com/office/drawing/2014/main" id="{DFD3A4B2-2A45-4C85-8CC4-6A8B9E138EA4}"/>
+              </a:ext>
+            </a:extLst>
+          </p:cNvPr>
+          <p:cNvSpPr/>
+          <p:nvPr/>
+        </p:nvSpPr>
+        <p:spPr>
+          <a:xfrm>
+            <a:off x="4387683" y="3556756"/>
+            <a:ext cx="218114" cy="209724"/>
+          </a:xfrm>
+          <a:prstGeom prst="ellipse">
+            <a:avLst/>
+          </a:prstGeom>
+        </p:spPr>
+        <p:style>
+          <a:lnRef idx="2">
+            <a:schemeClr val="accent1">
+              <a:shade val="50000"/>
+            </a:schemeClr>
+          </a:lnRef>
+          <a:fillRef idx="1">
+            <a:schemeClr val="accent1"/>
+          </a:fillRef>
+          <a:effectRef idx="0">
+            <a:schemeClr val="accent1"/>
+          </a:effectRef>
+          <a:fontRef idx="minor">
+            <a:schemeClr val="lt1"/>
+          </a:fontRef>
+        </p:style>
+        <p:txBody>
+          <a:bodyPr rtlCol="0" anchor="ctr"/>
+          <a:lstStyle/>
+          <a:p>
+            <a:pPr algn="ctr"/>
+            <a:endParaRPr lang="ko-KR" altLang="en-US"/>
+          </a:p>
+        </p:txBody>
+      </p:sp>
+      <p:cxnSp>
+        <p:nvCxnSpPr>
+          <p:cNvPr id="133" name="직선 연결선 132">
+            <a:extLst>
+              <a:ext uri="{FF2B5EF4-FFF2-40B4-BE49-F238E27FC236}">
+                <a16:creationId xmlns:a16="http://schemas.microsoft.com/office/drawing/2014/main" id="{6A0DD288-1B8E-4C18-B9F2-B3BD7498B1FB}"/>
+              </a:ext>
+            </a:extLst>
+          </p:cNvPr>
+          <p:cNvCxnSpPr>
+            <a:cxnSpLocks/>
+            <a:stCxn id="132" idx="7"/>
+            <a:endCxn id="124" idx="3"/>
+          </p:cNvCxnSpPr>
+          <p:nvPr/>
+        </p:nvCxnSpPr>
+        <p:spPr>
+          <a:xfrm flipV="1">
+            <a:off x="4573855" y="3468946"/>
+            <a:ext cx="75622" cy="118523"/>
+          </a:xfrm>
+          <a:prstGeom prst="line">
+            <a:avLst/>
+          </a:prstGeom>
+          <a:ln>
+            <a:solidFill>
+              <a:schemeClr val="tx1"/>
+            </a:solidFill>
+          </a:ln>
+        </p:spPr>
+        <p:style>
+          <a:lnRef idx="1">
+            <a:schemeClr val="accent1"/>
+          </a:lnRef>
+          <a:fillRef idx="0">
+            <a:schemeClr val="accent1"/>
+          </a:fillRef>
+          <a:effectRef idx="0">
+            <a:schemeClr val="accent1"/>
+          </a:effectRef>
+          <a:fontRef idx="minor">
+            <a:schemeClr val="tx1"/>
+          </a:fontRef>
+        </p:style>
+      </p:cxnSp>
+      <p:sp>
+        <p:nvSpPr>
+          <p:cNvPr id="135" name="타원 134">
+            <a:extLst>
+              <a:ext uri="{FF2B5EF4-FFF2-40B4-BE49-F238E27FC236}">
+                <a16:creationId xmlns:a16="http://schemas.microsoft.com/office/drawing/2014/main" id="{22068C99-DA3A-4520-A0C5-0834BBD96FF1}"/>
+              </a:ext>
+            </a:extLst>
+          </p:cNvPr>
+          <p:cNvSpPr/>
+          <p:nvPr/>
+        </p:nvSpPr>
+        <p:spPr>
+          <a:xfrm>
+            <a:off x="4161748" y="3166515"/>
+            <a:ext cx="218114" cy="209724"/>
+          </a:xfrm>
+          <a:prstGeom prst="ellipse">
+            <a:avLst/>
+          </a:prstGeom>
+        </p:spPr>
+        <p:style>
+          <a:lnRef idx="2">
+            <a:schemeClr val="accent1">
+              <a:shade val="50000"/>
+            </a:schemeClr>
+          </a:lnRef>
+          <a:fillRef idx="1">
+            <a:schemeClr val="accent1"/>
+          </a:fillRef>
+          <a:effectRef idx="0">
+            <a:schemeClr val="accent1"/>
+          </a:effectRef>
+          <a:fontRef idx="minor">
+            <a:schemeClr val="lt1"/>
+          </a:fontRef>
+        </p:style>
+        <p:txBody>
+          <a:bodyPr rtlCol="0" anchor="ctr"/>
+          <a:lstStyle/>
+          <a:p>
+            <a:pPr algn="ctr"/>
+            <a:endParaRPr lang="ko-KR" altLang="en-US"/>
+          </a:p>
+        </p:txBody>
+      </p:sp>
+      <p:cxnSp>
+        <p:nvCxnSpPr>
+          <p:cNvPr id="136" name="직선 연결선 135">
+            <a:extLst>
+              <a:ext uri="{FF2B5EF4-FFF2-40B4-BE49-F238E27FC236}">
+                <a16:creationId xmlns:a16="http://schemas.microsoft.com/office/drawing/2014/main" id="{58C485FA-F664-4963-AAD2-6167A6A132C9}"/>
+              </a:ext>
+            </a:extLst>
+          </p:cNvPr>
+          <p:cNvCxnSpPr>
+            <a:cxnSpLocks/>
+            <a:stCxn id="135" idx="6"/>
+            <a:endCxn id="124" idx="2"/>
+          </p:cNvCxnSpPr>
+          <p:nvPr/>
+        </p:nvCxnSpPr>
+        <p:spPr>
+          <a:xfrm>
+            <a:off x="4379862" y="3271377"/>
+            <a:ext cx="225935" cy="88585"/>
+          </a:xfrm>
+          <a:prstGeom prst="line">
+            <a:avLst/>
+          </a:prstGeom>
+          <a:ln>
+            <a:solidFill>
+              <a:schemeClr val="tx1"/>
+            </a:solidFill>
+          </a:ln>
+        </p:spPr>
+        <p:style>
+          <a:lnRef idx="1">
+            <a:schemeClr val="accent1"/>
+          </a:lnRef>
+          <a:fillRef idx="0">
+            <a:schemeClr val="accent1"/>
+          </a:fillRef>
+          <a:effectRef idx="0">
+            <a:schemeClr val="accent1"/>
+          </a:effectRef>
+          <a:fontRef idx="minor">
+            <a:schemeClr val="tx1"/>
+          </a:fontRef>
+        </p:style>
+      </p:cxnSp>
+      <p:sp>
+        <p:nvSpPr>
+          <p:cNvPr id="140" name="타원 139">
+            <a:extLst>
+              <a:ext uri="{FF2B5EF4-FFF2-40B4-BE49-F238E27FC236}">
+                <a16:creationId xmlns:a16="http://schemas.microsoft.com/office/drawing/2014/main" id="{686D615F-8DB4-4FD9-B250-368CD9B7D38C}"/>
+              </a:ext>
+            </a:extLst>
+          </p:cNvPr>
+          <p:cNvSpPr/>
+          <p:nvPr/>
+        </p:nvSpPr>
+        <p:spPr>
+          <a:xfrm>
+            <a:off x="5797734" y="2769422"/>
+            <a:ext cx="298266" cy="308254"/>
+          </a:xfrm>
+          <a:prstGeom prst="ellipse">
+            <a:avLst/>
+          </a:prstGeom>
+          <a:solidFill>
+            <a:srgbClr val="FFC000"/>
+          </a:solidFill>
+        </p:spPr>
+        <p:style>
+          <a:lnRef idx="2">
+            <a:schemeClr val="accent1">
+              <a:shade val="50000"/>
+            </a:schemeClr>
+          </a:lnRef>
+          <a:fillRef idx="1">
+            <a:schemeClr val="accent1"/>
+          </a:fillRef>
+          <a:effectRef idx="0">
+            <a:schemeClr val="accent1"/>
+          </a:effectRef>
+          <a:fontRef idx="minor">
+            <a:schemeClr val="lt1"/>
+          </a:fontRef>
+        </p:style>
+        <p:txBody>
+          <a:bodyPr rtlCol="0" anchor="ctr"/>
+          <a:lstStyle/>
+          <a:p>
+            <a:pPr algn="ctr"/>
+            <a:r>
+              <a:rPr lang="en-US" altLang="ko-KR" dirty="0"/>
+              <a:t>C</a:t>
+            </a:r>
+            <a:endParaRPr lang="ko-KR" altLang="en-US" dirty="0"/>
+          </a:p>
+        </p:txBody>
+      </p:sp>
+      <p:cxnSp>
+        <p:nvCxnSpPr>
+          <p:cNvPr id="141" name="직선 연결선 140">
+            <a:extLst>
+              <a:ext uri="{FF2B5EF4-FFF2-40B4-BE49-F238E27FC236}">
+                <a16:creationId xmlns:a16="http://schemas.microsoft.com/office/drawing/2014/main" id="{32346D01-0494-43D2-94AE-8C4CA6F0F922}"/>
+              </a:ext>
+            </a:extLst>
+          </p:cNvPr>
+          <p:cNvCxnSpPr>
+            <a:cxnSpLocks/>
+            <a:stCxn id="124" idx="6"/>
+            <a:endCxn id="140" idx="3"/>
+          </p:cNvCxnSpPr>
+          <p:nvPr/>
+        </p:nvCxnSpPr>
+        <p:spPr>
+          <a:xfrm flipV="1">
+            <a:off x="4904063" y="3032533"/>
+            <a:ext cx="937351" cy="327429"/>
+          </a:xfrm>
+          <a:prstGeom prst="line">
+            <a:avLst/>
+          </a:prstGeom>
+          <a:ln>
+            <a:solidFill>
+              <a:schemeClr val="tx1"/>
+            </a:solidFill>
+          </a:ln>
+        </p:spPr>
+        <p:style>
+          <a:lnRef idx="1">
+            <a:schemeClr val="accent1"/>
+          </a:lnRef>
+          <a:fillRef idx="0">
+            <a:schemeClr val="accent1"/>
+          </a:fillRef>
+          <a:effectRef idx="0">
+            <a:schemeClr val="accent1"/>
+          </a:effectRef>
+          <a:fontRef idx="minor">
+            <a:schemeClr val="tx1"/>
+          </a:fontRef>
+        </p:style>
+      </p:cxnSp>
+      <p:cxnSp>
+        <p:nvCxnSpPr>
+          <p:cNvPr id="145" name="직선 연결선 144">
+            <a:extLst>
+              <a:ext uri="{FF2B5EF4-FFF2-40B4-BE49-F238E27FC236}">
+                <a16:creationId xmlns:a16="http://schemas.microsoft.com/office/drawing/2014/main" id="{B291635E-9DE4-4F2E-A444-9619F5998A9B}"/>
+              </a:ext>
+            </a:extLst>
+          </p:cNvPr>
+          <p:cNvCxnSpPr>
+            <a:cxnSpLocks/>
+            <a:endCxn id="140" idx="1"/>
+          </p:cNvCxnSpPr>
+          <p:nvPr/>
+        </p:nvCxnSpPr>
+        <p:spPr>
+          <a:xfrm>
+            <a:off x="4783581" y="2553328"/>
+            <a:ext cx="1057833" cy="261237"/>
+          </a:xfrm>
+          <a:prstGeom prst="line">
+            <a:avLst/>
+          </a:prstGeom>
+          <a:ln>
+            <a:solidFill>
+              <a:schemeClr val="tx1"/>
+            </a:solidFill>
+          </a:ln>
+        </p:spPr>
+        <p:style>
+          <a:lnRef idx="1">
+            <a:schemeClr val="accent1"/>
+          </a:lnRef>
+          <a:fillRef idx="0">
+            <a:schemeClr val="accent1"/>
+          </a:fillRef>
+          <a:effectRef idx="0">
+            <a:schemeClr val="accent1"/>
+          </a:effectRef>
+          <a:fontRef idx="minor">
+            <a:schemeClr val="tx1"/>
+          </a:fontRef>
+        </p:style>
+      </p:cxnSp>
+      <p:sp>
+        <p:nvSpPr>
+          <p:cNvPr id="164" name="타원 163">
+            <a:extLst>
+              <a:ext uri="{FF2B5EF4-FFF2-40B4-BE49-F238E27FC236}">
+                <a16:creationId xmlns:a16="http://schemas.microsoft.com/office/drawing/2014/main" id="{8126FFF1-0C6E-4681-A9E9-8B2193241591}"/>
+              </a:ext>
+            </a:extLst>
+          </p:cNvPr>
+          <p:cNvSpPr/>
+          <p:nvPr/>
+        </p:nvSpPr>
+        <p:spPr>
+          <a:xfrm>
+            <a:off x="6373286" y="2760485"/>
+            <a:ext cx="218114" cy="209724"/>
+          </a:xfrm>
+          <a:prstGeom prst="ellipse">
+            <a:avLst/>
+          </a:prstGeom>
+        </p:spPr>
+        <p:style>
+          <a:lnRef idx="2">
+            <a:schemeClr val="accent1">
+              <a:shade val="50000"/>
+            </a:schemeClr>
+          </a:lnRef>
+          <a:fillRef idx="1">
+            <a:schemeClr val="accent1"/>
+          </a:fillRef>
+          <a:effectRef idx="0">
+            <a:schemeClr val="accent1"/>
+          </a:effectRef>
+          <a:fontRef idx="minor">
+            <a:schemeClr val="lt1"/>
+          </a:fontRef>
+        </p:style>
+        <p:txBody>
+          <a:bodyPr rtlCol="0" anchor="ctr"/>
+          <a:lstStyle/>
+          <a:p>
+            <a:pPr algn="ctr"/>
+            <a:endParaRPr lang="ko-KR" altLang="en-US"/>
+          </a:p>
+        </p:txBody>
+      </p:sp>
+      <p:sp>
+        <p:nvSpPr>
+          <p:cNvPr id="165" name="타원 164">
+            <a:extLst>
+              <a:ext uri="{FF2B5EF4-FFF2-40B4-BE49-F238E27FC236}">
+                <a16:creationId xmlns:a16="http://schemas.microsoft.com/office/drawing/2014/main" id="{6C6C4B46-C9B5-4617-8E07-993A75588961}"/>
+              </a:ext>
+            </a:extLst>
+          </p:cNvPr>
+          <p:cNvSpPr/>
+          <p:nvPr/>
+        </p:nvSpPr>
+        <p:spPr>
+          <a:xfrm>
+            <a:off x="6136459" y="2452447"/>
+            <a:ext cx="218114" cy="209724"/>
+          </a:xfrm>
+          <a:prstGeom prst="ellipse">
+            <a:avLst/>
+          </a:prstGeom>
+        </p:spPr>
+        <p:style>
+          <a:lnRef idx="2">
+            <a:schemeClr val="accent1">
+              <a:shade val="50000"/>
+            </a:schemeClr>
+          </a:lnRef>
+          <a:fillRef idx="1">
+            <a:schemeClr val="accent1"/>
+          </a:fillRef>
+          <a:effectRef idx="0">
+            <a:schemeClr val="accent1"/>
+          </a:effectRef>
+          <a:fontRef idx="minor">
+            <a:schemeClr val="lt1"/>
+          </a:fontRef>
+        </p:style>
+        <p:txBody>
+          <a:bodyPr rtlCol="0" anchor="ctr"/>
+          <a:lstStyle/>
+          <a:p>
+            <a:pPr algn="ctr"/>
+            <a:endParaRPr lang="ko-KR" altLang="en-US"/>
+          </a:p>
+        </p:txBody>
+      </p:sp>
+      <p:cxnSp>
+        <p:nvCxnSpPr>
+          <p:cNvPr id="166" name="직선 연결선 165">
+            <a:extLst>
+              <a:ext uri="{FF2B5EF4-FFF2-40B4-BE49-F238E27FC236}">
+                <a16:creationId xmlns:a16="http://schemas.microsoft.com/office/drawing/2014/main" id="{661A1586-CBB7-4536-84A7-A4560E92AFF7}"/>
+              </a:ext>
+            </a:extLst>
+          </p:cNvPr>
+          <p:cNvCxnSpPr>
+            <a:cxnSpLocks/>
+            <a:stCxn id="140" idx="7"/>
+            <a:endCxn id="165" idx="3"/>
+          </p:cNvCxnSpPr>
+          <p:nvPr/>
+        </p:nvCxnSpPr>
+        <p:spPr>
+          <a:xfrm flipV="1">
+            <a:off x="6052320" y="2631458"/>
+            <a:ext cx="116081" cy="183107"/>
+          </a:xfrm>
+          <a:prstGeom prst="line">
+            <a:avLst/>
+          </a:prstGeom>
+          <a:ln>
+            <a:solidFill>
+              <a:schemeClr val="tx1"/>
+            </a:solidFill>
+          </a:ln>
+        </p:spPr>
+        <p:style>
+          <a:lnRef idx="1">
+            <a:schemeClr val="accent1"/>
+          </a:lnRef>
+          <a:fillRef idx="0">
+            <a:schemeClr val="accent1"/>
+          </a:fillRef>
+          <a:effectRef idx="0">
+            <a:schemeClr val="accent1"/>
+          </a:effectRef>
+          <a:fontRef idx="minor">
+            <a:schemeClr val="tx1"/>
+          </a:fontRef>
+        </p:style>
+      </p:cxnSp>
+      <p:sp>
+        <p:nvSpPr>
+          <p:cNvPr id="167" name="타원 166">
+            <a:extLst>
+              <a:ext uri="{FF2B5EF4-FFF2-40B4-BE49-F238E27FC236}">
+                <a16:creationId xmlns:a16="http://schemas.microsoft.com/office/drawing/2014/main" id="{00A4A5DA-621F-4264-891F-CEBE84E6ABC8}"/>
+              </a:ext>
+            </a:extLst>
+          </p:cNvPr>
+          <p:cNvSpPr/>
+          <p:nvPr/>
+        </p:nvSpPr>
+        <p:spPr>
+          <a:xfrm>
+            <a:off x="5666360" y="2421734"/>
+            <a:ext cx="218114" cy="209724"/>
+          </a:xfrm>
+          <a:prstGeom prst="ellipse">
+            <a:avLst/>
+          </a:prstGeom>
+        </p:spPr>
+        <p:style>
+          <a:lnRef idx="2">
+            <a:schemeClr val="accent1">
+              <a:shade val="50000"/>
+            </a:schemeClr>
+          </a:lnRef>
+          <a:fillRef idx="1">
+            <a:schemeClr val="accent1"/>
+          </a:fillRef>
+          <a:effectRef idx="0">
+            <a:schemeClr val="accent1"/>
+          </a:effectRef>
+          <a:fontRef idx="minor">
+            <a:schemeClr val="lt1"/>
+          </a:fontRef>
+        </p:style>
+        <p:txBody>
+          <a:bodyPr rtlCol="0" anchor="ctr"/>
+          <a:lstStyle/>
+          <a:p>
+            <a:pPr algn="ctr"/>
+            <a:endParaRPr lang="ko-KR" altLang="en-US"/>
+          </a:p>
+        </p:txBody>
+      </p:sp>
+      <p:cxnSp>
+        <p:nvCxnSpPr>
+          <p:cNvPr id="168" name="직선 연결선 167">
+            <a:extLst>
+              <a:ext uri="{FF2B5EF4-FFF2-40B4-BE49-F238E27FC236}">
+                <a16:creationId xmlns:a16="http://schemas.microsoft.com/office/drawing/2014/main" id="{AF052B78-9387-41D8-BA52-B78514A1679C}"/>
+              </a:ext>
+            </a:extLst>
+          </p:cNvPr>
+          <p:cNvCxnSpPr>
+            <a:cxnSpLocks/>
+            <a:stCxn id="167" idx="5"/>
+            <a:endCxn id="140" idx="0"/>
+          </p:cNvCxnSpPr>
+          <p:nvPr/>
+        </p:nvCxnSpPr>
+        <p:spPr>
+          <a:xfrm>
+            <a:off x="5852532" y="2600745"/>
+            <a:ext cx="94335" cy="168677"/>
+          </a:xfrm>
+          <a:prstGeom prst="line">
+            <a:avLst/>
+          </a:prstGeom>
+          <a:ln>
+            <a:solidFill>
+              <a:schemeClr val="tx1"/>
+            </a:solidFill>
+          </a:ln>
+        </p:spPr>
+        <p:style>
+          <a:lnRef idx="1">
+            <a:schemeClr val="accent1"/>
+          </a:lnRef>
+          <a:fillRef idx="0">
+            <a:schemeClr val="accent1"/>
+          </a:fillRef>
+          <a:effectRef idx="0">
+            <a:schemeClr val="accent1"/>
+          </a:effectRef>
+          <a:fontRef idx="minor">
+            <a:schemeClr val="tx1"/>
+          </a:fontRef>
+        </p:style>
+      </p:cxnSp>
+      <p:sp>
+        <p:nvSpPr>
+          <p:cNvPr id="169" name="타원 168">
+            <a:extLst>
+              <a:ext uri="{FF2B5EF4-FFF2-40B4-BE49-F238E27FC236}">
+                <a16:creationId xmlns:a16="http://schemas.microsoft.com/office/drawing/2014/main" id="{2A455C51-FB07-44C3-80D0-F618E5227124}"/>
+              </a:ext>
+            </a:extLst>
+          </p:cNvPr>
+          <p:cNvSpPr/>
+          <p:nvPr/>
+        </p:nvSpPr>
+        <p:spPr>
+          <a:xfrm>
+            <a:off x="6169302" y="3082933"/>
+            <a:ext cx="218114" cy="209724"/>
+          </a:xfrm>
+          <a:prstGeom prst="ellipse">
+            <a:avLst/>
+          </a:prstGeom>
+        </p:spPr>
+        <p:style>
+          <a:lnRef idx="2">
+            <a:schemeClr val="accent1">
+              <a:shade val="50000"/>
+            </a:schemeClr>
+          </a:lnRef>
+          <a:fillRef idx="1">
+            <a:schemeClr val="accent1"/>
+          </a:fillRef>
+          <a:effectRef idx="0">
+            <a:schemeClr val="accent1"/>
+          </a:effectRef>
+          <a:fontRef idx="minor">
+            <a:schemeClr val="lt1"/>
+          </a:fontRef>
+        </p:style>
+        <p:txBody>
+          <a:bodyPr rtlCol="0" anchor="ctr"/>
+          <a:lstStyle/>
+          <a:p>
+            <a:pPr algn="ctr"/>
+            <a:endParaRPr lang="ko-KR" altLang="en-US"/>
+          </a:p>
+        </p:txBody>
+      </p:sp>
+      <p:cxnSp>
+        <p:nvCxnSpPr>
+          <p:cNvPr id="170" name="직선 연결선 169">
+            <a:extLst>
+              <a:ext uri="{FF2B5EF4-FFF2-40B4-BE49-F238E27FC236}">
+                <a16:creationId xmlns:a16="http://schemas.microsoft.com/office/drawing/2014/main" id="{0B491C9F-CFD9-4848-9754-3945F479D5B2}"/>
+              </a:ext>
+            </a:extLst>
+          </p:cNvPr>
+          <p:cNvCxnSpPr>
+            <a:cxnSpLocks/>
+            <a:stCxn id="169" idx="1"/>
+            <a:endCxn id="140" idx="5"/>
+          </p:cNvCxnSpPr>
+          <p:nvPr/>
+        </p:nvCxnSpPr>
+        <p:spPr>
+          <a:xfrm flipH="1" flipV="1">
+            <a:off x="6052320" y="3032533"/>
+            <a:ext cx="148924" cy="81113"/>
+          </a:xfrm>
+          <a:prstGeom prst="line">
+            <a:avLst/>
+          </a:prstGeom>
+          <a:ln>
+            <a:solidFill>
+              <a:schemeClr val="tx1"/>
+            </a:solidFill>
+          </a:ln>
+        </p:spPr>
+        <p:style>
+          <a:lnRef idx="1">
+            <a:schemeClr val="accent1"/>
+          </a:lnRef>
+          <a:fillRef idx="0">
+            <a:schemeClr val="accent1"/>
+          </a:fillRef>
+          <a:effectRef idx="0">
+            <a:schemeClr val="accent1"/>
+          </a:effectRef>
+          <a:fontRef idx="minor">
+            <a:schemeClr val="tx1"/>
+          </a:fontRef>
+        </p:style>
+      </p:cxnSp>
+      <p:cxnSp>
+        <p:nvCxnSpPr>
+          <p:cNvPr id="176" name="직선 연결선 175">
+            <a:extLst>
+              <a:ext uri="{FF2B5EF4-FFF2-40B4-BE49-F238E27FC236}">
+                <a16:creationId xmlns:a16="http://schemas.microsoft.com/office/drawing/2014/main" id="{5B5E0A66-26E4-4B64-842B-E547F8FDD51D}"/>
+              </a:ext>
+            </a:extLst>
+          </p:cNvPr>
+          <p:cNvCxnSpPr>
+            <a:cxnSpLocks/>
+            <a:stCxn id="140" idx="6"/>
+            <a:endCxn id="164" idx="2"/>
+          </p:cNvCxnSpPr>
+          <p:nvPr/>
+        </p:nvCxnSpPr>
+        <p:spPr>
+          <a:xfrm flipV="1">
+            <a:off x="6096000" y="2865347"/>
+            <a:ext cx="277286" cy="58202"/>
+          </a:xfrm>
+          <a:prstGeom prst="line">
+            <a:avLst/>
+          </a:prstGeom>
+          <a:ln>
+            <a:solidFill>
+              <a:schemeClr val="tx1"/>
+            </a:solidFill>
+          </a:ln>
+        </p:spPr>
+        <p:style>
+          <a:lnRef idx="1">
+            <a:schemeClr val="accent1"/>
+          </a:lnRef>
+          <a:fillRef idx="0">
+            <a:schemeClr val="accent1"/>
+          </a:fillRef>
+          <a:effectRef idx="0">
+            <a:schemeClr val="accent1"/>
+          </a:effectRef>
+          <a:fontRef idx="minor">
+            <a:schemeClr val="tx1"/>
+          </a:fontRef>
+        </p:style>
+      </p:cxnSp>
+      <p:sp>
+        <p:nvSpPr>
+          <p:cNvPr id="180" name="타원 179">
+            <a:extLst>
+              <a:ext uri="{FF2B5EF4-FFF2-40B4-BE49-F238E27FC236}">
+                <a16:creationId xmlns:a16="http://schemas.microsoft.com/office/drawing/2014/main" id="{7842D223-EF50-4415-BCC3-CEC8AEF7D9AD}"/>
+              </a:ext>
+            </a:extLst>
+          </p:cNvPr>
+          <p:cNvSpPr/>
+          <p:nvPr/>
+        </p:nvSpPr>
+        <p:spPr>
+          <a:xfrm>
+            <a:off x="5804585" y="3259222"/>
+            <a:ext cx="218114" cy="209724"/>
+          </a:xfrm>
+          <a:prstGeom prst="ellipse">
+            <a:avLst/>
+          </a:prstGeom>
+        </p:spPr>
+        <p:style>
+          <a:lnRef idx="2">
+            <a:schemeClr val="accent1">
+              <a:shade val="50000"/>
+            </a:schemeClr>
+          </a:lnRef>
+          <a:fillRef idx="1">
+            <a:schemeClr val="accent1"/>
+          </a:fillRef>
+          <a:effectRef idx="0">
+            <a:schemeClr val="accent1"/>
+          </a:effectRef>
+          <a:fontRef idx="minor">
+            <a:schemeClr val="lt1"/>
+          </a:fontRef>
+        </p:style>
+        <p:txBody>
+          <a:bodyPr rtlCol="0" anchor="ctr"/>
+          <a:lstStyle/>
+          <a:p>
+            <a:pPr algn="ctr"/>
+            <a:endParaRPr lang="ko-KR" altLang="en-US"/>
+          </a:p>
+        </p:txBody>
+      </p:sp>
+      <p:cxnSp>
+        <p:nvCxnSpPr>
+          <p:cNvPr id="181" name="직선 연결선 180">
+            <a:extLst>
+              <a:ext uri="{FF2B5EF4-FFF2-40B4-BE49-F238E27FC236}">
+                <a16:creationId xmlns:a16="http://schemas.microsoft.com/office/drawing/2014/main" id="{5D3D1CB0-14A5-4F6D-8494-D4C375096F3E}"/>
+              </a:ext>
+            </a:extLst>
+          </p:cNvPr>
+          <p:cNvCxnSpPr>
+            <a:cxnSpLocks/>
+            <a:stCxn id="140" idx="4"/>
+            <a:endCxn id="180" idx="0"/>
+          </p:cNvCxnSpPr>
+          <p:nvPr/>
+        </p:nvCxnSpPr>
+        <p:spPr>
+          <a:xfrm flipH="1">
+            <a:off x="5913642" y="3077676"/>
+            <a:ext cx="33225" cy="181546"/>
+          </a:xfrm>
+          <a:prstGeom prst="line">
+            <a:avLst/>
+          </a:prstGeom>
+          <a:ln>
+            <a:solidFill>
+              <a:schemeClr val="tx1"/>
+            </a:solidFill>
+          </a:ln>
+        </p:spPr>
+        <p:style>
+          <a:lnRef idx="1">
+            <a:schemeClr val="accent1"/>
+          </a:lnRef>
+          <a:fillRef idx="0">
+            <a:schemeClr val="accent1"/>
+          </a:fillRef>
+          <a:effectRef idx="0">
+            <a:schemeClr val="accent1"/>
+          </a:effectRef>
+          <a:fontRef idx="minor">
+            <a:schemeClr val="tx1"/>
+          </a:fontRef>
+        </p:style>
+      </p:cxnSp>
+      <p:sp>
+        <p:nvSpPr>
+          <p:cNvPr id="184" name="사각형: 잘린 대각선 방향 모서리 183">
+            <a:extLst>
+              <a:ext uri="{FF2B5EF4-FFF2-40B4-BE49-F238E27FC236}">
+                <a16:creationId xmlns:a16="http://schemas.microsoft.com/office/drawing/2014/main" id="{24FD0201-7E4B-4E48-9E6E-3DA1BF23B79C}"/>
+              </a:ext>
+            </a:extLst>
+          </p:cNvPr>
+          <p:cNvSpPr/>
+          <p:nvPr/>
+        </p:nvSpPr>
+        <p:spPr>
+          <a:xfrm>
+            <a:off x="2948919" y="2293063"/>
+            <a:ext cx="4495742" cy="5903100"/>
+          </a:xfrm>
+          <a:prstGeom prst="snip2DiagRect">
+            <a:avLst/>
+          </a:prstGeom>
+          <a:ln>
+            <a:solidFill>
+              <a:schemeClr val="tx1"/>
+            </a:solidFill>
+          </a:ln>
+          <a:scene3d>
+            <a:camera prst="isometricOffAxis2Top"/>
+            <a:lightRig rig="threePt" dir="t"/>
+          </a:scene3d>
+        </p:spPr>
+        <p:style>
+          <a:lnRef idx="2">
+            <a:schemeClr val="accent3"/>
+          </a:lnRef>
+          <a:fillRef idx="1">
+            <a:schemeClr val="lt1"/>
+          </a:fillRef>
+          <a:effectRef idx="0">
+            <a:schemeClr val="accent3"/>
+          </a:effectRef>
+          <a:fontRef idx="minor">
+            <a:schemeClr val="dk1"/>
+          </a:fontRef>
+        </p:style>
+        <p:txBody>
+          <a:bodyPr rtlCol="0" anchor="ctr"/>
+          <a:lstStyle/>
+          <a:p>
+            <a:pPr algn="ctr"/>
+            <a:endParaRPr lang="ko-KR" altLang="en-US"/>
+          </a:p>
+        </p:txBody>
+      </p:sp>
+      <p:sp>
+        <p:nvSpPr>
+          <p:cNvPr id="185" name="타원 184">
+            <a:extLst>
+              <a:ext uri="{FF2B5EF4-FFF2-40B4-BE49-F238E27FC236}">
+                <a16:creationId xmlns:a16="http://schemas.microsoft.com/office/drawing/2014/main" id="{056D5407-846F-4566-85CC-9752696133BF}"/>
+              </a:ext>
+            </a:extLst>
+          </p:cNvPr>
+          <p:cNvSpPr/>
+          <p:nvPr/>
+        </p:nvSpPr>
+        <p:spPr>
+          <a:xfrm>
+            <a:off x="5060640" y="4665912"/>
+            <a:ext cx="218114" cy="209724"/>
+          </a:xfrm>
+          <a:prstGeom prst="ellipse">
+            <a:avLst/>
+          </a:prstGeom>
+        </p:spPr>
+        <p:style>
+          <a:lnRef idx="2">
+            <a:schemeClr val="accent1">
+              <a:shade val="50000"/>
+            </a:schemeClr>
+          </a:lnRef>
+          <a:fillRef idx="1">
+            <a:schemeClr val="accent1"/>
+          </a:fillRef>
+          <a:effectRef idx="0">
+            <a:schemeClr val="accent1"/>
+          </a:effectRef>
+          <a:fontRef idx="minor">
+            <a:schemeClr val="lt1"/>
+          </a:fontRef>
+        </p:style>
+        <p:txBody>
+          <a:bodyPr rtlCol="0" anchor="ctr"/>
+          <a:lstStyle/>
+          <a:p>
+            <a:pPr algn="ctr"/>
+            <a:endParaRPr lang="ko-KR" altLang="en-US"/>
+          </a:p>
+        </p:txBody>
+      </p:sp>
+      <p:sp>
+        <p:nvSpPr>
+          <p:cNvPr id="186" name="타원 185">
+            <a:extLst>
+              <a:ext uri="{FF2B5EF4-FFF2-40B4-BE49-F238E27FC236}">
+                <a16:creationId xmlns:a16="http://schemas.microsoft.com/office/drawing/2014/main" id="{71AEE6F7-4846-4287-AA63-202D79E82C90}"/>
+              </a:ext>
+            </a:extLst>
+          </p:cNvPr>
+          <p:cNvSpPr/>
+          <p:nvPr/>
+        </p:nvSpPr>
+        <p:spPr>
+          <a:xfrm>
+            <a:off x="3931462" y="4688407"/>
+            <a:ext cx="218114" cy="209724"/>
+          </a:xfrm>
+          <a:prstGeom prst="ellipse">
+            <a:avLst/>
+          </a:prstGeom>
+        </p:spPr>
+        <p:style>
+          <a:lnRef idx="2">
+            <a:schemeClr val="accent1">
+              <a:shade val="50000"/>
+            </a:schemeClr>
+          </a:lnRef>
+          <a:fillRef idx="1">
+            <a:schemeClr val="accent1"/>
+          </a:fillRef>
+          <a:effectRef idx="0">
+            <a:schemeClr val="accent1"/>
+          </a:effectRef>
+          <a:fontRef idx="minor">
+            <a:schemeClr val="lt1"/>
+          </a:fontRef>
+        </p:style>
+        <p:txBody>
+          <a:bodyPr rtlCol="0" anchor="ctr"/>
+          <a:lstStyle/>
+          <a:p>
+            <a:pPr algn="ctr"/>
+            <a:endParaRPr lang="ko-KR" altLang="en-US"/>
+          </a:p>
+        </p:txBody>
+      </p:sp>
+      <p:sp>
+        <p:nvSpPr>
+          <p:cNvPr id="187" name="타원 186">
+            <a:extLst>
+              <a:ext uri="{FF2B5EF4-FFF2-40B4-BE49-F238E27FC236}">
+                <a16:creationId xmlns:a16="http://schemas.microsoft.com/office/drawing/2014/main" id="{11937915-5A9C-4337-A622-A8E6FA5C6170}"/>
+              </a:ext>
+            </a:extLst>
+          </p:cNvPr>
+          <p:cNvSpPr/>
+          <p:nvPr/>
+        </p:nvSpPr>
+        <p:spPr>
+          <a:xfrm>
+            <a:off x="4809683" y="4373821"/>
+            <a:ext cx="218114" cy="209724"/>
+          </a:xfrm>
+          <a:prstGeom prst="ellipse">
+            <a:avLst/>
+          </a:prstGeom>
+        </p:spPr>
+        <p:style>
+          <a:lnRef idx="2">
+            <a:schemeClr val="accent1">
+              <a:shade val="50000"/>
+            </a:schemeClr>
+          </a:lnRef>
+          <a:fillRef idx="1">
+            <a:schemeClr val="accent1"/>
+          </a:fillRef>
+          <a:effectRef idx="0">
+            <a:schemeClr val="accent1"/>
+          </a:effectRef>
+          <a:fontRef idx="minor">
+            <a:schemeClr val="lt1"/>
+          </a:fontRef>
+        </p:style>
+        <p:txBody>
+          <a:bodyPr rtlCol="0" anchor="ctr"/>
+          <a:lstStyle/>
+          <a:p>
+            <a:pPr algn="ctr"/>
+            <a:endParaRPr lang="ko-KR" altLang="en-US"/>
+          </a:p>
+        </p:txBody>
+      </p:sp>
+      <p:sp>
+        <p:nvSpPr>
+          <p:cNvPr id="188" name="타원 187">
+            <a:extLst>
+              <a:ext uri="{FF2B5EF4-FFF2-40B4-BE49-F238E27FC236}">
+                <a16:creationId xmlns:a16="http://schemas.microsoft.com/office/drawing/2014/main" id="{095B9179-E311-4722-824B-4997D50678EE}"/>
+              </a:ext>
+            </a:extLst>
+          </p:cNvPr>
+          <p:cNvSpPr/>
+          <p:nvPr/>
+        </p:nvSpPr>
+        <p:spPr>
+          <a:xfrm>
+            <a:off x="4485315" y="4639142"/>
+            <a:ext cx="298266" cy="308254"/>
+          </a:xfrm>
+          <a:prstGeom prst="ellipse">
+            <a:avLst/>
+          </a:prstGeom>
+          <a:solidFill>
+            <a:srgbClr val="FFC000"/>
+          </a:solidFill>
+        </p:spPr>
+        <p:style>
+          <a:lnRef idx="2">
+            <a:schemeClr val="accent1">
+              <a:shade val="50000"/>
+            </a:schemeClr>
+          </a:lnRef>
+          <a:fillRef idx="1">
+            <a:schemeClr val="accent1"/>
+          </a:fillRef>
+          <a:effectRef idx="0">
+            <a:schemeClr val="accent1"/>
+          </a:effectRef>
+          <a:fontRef idx="minor">
+            <a:schemeClr val="lt1"/>
+          </a:fontRef>
+        </p:style>
+        <p:txBody>
+          <a:bodyPr rtlCol="0" anchor="ctr"/>
+          <a:lstStyle/>
+          <a:p>
+            <a:pPr algn="ctr"/>
+            <a:r>
+              <a:rPr lang="en-US" altLang="ko-KR" dirty="0"/>
+              <a:t>A</a:t>
+            </a:r>
+            <a:endParaRPr lang="ko-KR" altLang="en-US" dirty="0"/>
+          </a:p>
+        </p:txBody>
+      </p:sp>
+      <p:cxnSp>
+        <p:nvCxnSpPr>
+          <p:cNvPr id="189" name="직선 연결선 188">
+            <a:extLst>
+              <a:ext uri="{FF2B5EF4-FFF2-40B4-BE49-F238E27FC236}">
+                <a16:creationId xmlns:a16="http://schemas.microsoft.com/office/drawing/2014/main" id="{AADB2316-F13C-42D6-A972-6DD3BE773568}"/>
+              </a:ext>
+            </a:extLst>
+          </p:cNvPr>
+          <p:cNvCxnSpPr>
+            <a:cxnSpLocks/>
+            <a:stCxn id="186" idx="6"/>
+            <a:endCxn id="188" idx="2"/>
+          </p:cNvCxnSpPr>
+          <p:nvPr/>
+        </p:nvCxnSpPr>
+        <p:spPr>
+          <a:xfrm>
+            <a:off x="4149576" y="4793269"/>
+            <a:ext cx="335739" cy="0"/>
+          </a:xfrm>
+          <a:prstGeom prst="line">
+            <a:avLst/>
+          </a:prstGeom>
+          <a:ln>
+            <a:solidFill>
+              <a:schemeClr val="tx1"/>
+            </a:solidFill>
+          </a:ln>
+        </p:spPr>
+        <p:style>
+          <a:lnRef idx="1">
+            <a:schemeClr val="accent1"/>
+          </a:lnRef>
+          <a:fillRef idx="0">
+            <a:schemeClr val="accent1"/>
+          </a:fillRef>
+          <a:effectRef idx="0">
+            <a:schemeClr val="accent1"/>
+          </a:effectRef>
+          <a:fontRef idx="minor">
+            <a:schemeClr val="tx1"/>
+          </a:fontRef>
+        </p:style>
+      </p:cxnSp>
+      <p:cxnSp>
+        <p:nvCxnSpPr>
+          <p:cNvPr id="190" name="직선 연결선 189">
+            <a:extLst>
+              <a:ext uri="{FF2B5EF4-FFF2-40B4-BE49-F238E27FC236}">
+                <a16:creationId xmlns:a16="http://schemas.microsoft.com/office/drawing/2014/main" id="{04ACBF2D-4F95-45CA-8456-2307F8EEB099}"/>
+              </a:ext>
+            </a:extLst>
+          </p:cNvPr>
+          <p:cNvCxnSpPr>
+            <a:cxnSpLocks/>
+            <a:stCxn id="188" idx="7"/>
+            <a:endCxn id="187" idx="3"/>
+          </p:cNvCxnSpPr>
+          <p:nvPr/>
+        </p:nvCxnSpPr>
+        <p:spPr>
+          <a:xfrm flipV="1">
+            <a:off x="4739901" y="4552832"/>
+            <a:ext cx="101724" cy="131453"/>
+          </a:xfrm>
+          <a:prstGeom prst="line">
+            <a:avLst/>
+          </a:prstGeom>
+          <a:ln>
+            <a:solidFill>
+              <a:schemeClr val="tx1"/>
+            </a:solidFill>
+          </a:ln>
+        </p:spPr>
+        <p:style>
+          <a:lnRef idx="1">
+            <a:schemeClr val="accent1"/>
+          </a:lnRef>
+          <a:fillRef idx="0">
+            <a:schemeClr val="accent1"/>
+          </a:fillRef>
+          <a:effectRef idx="0">
+            <a:schemeClr val="accent1"/>
+          </a:effectRef>
+          <a:fontRef idx="minor">
+            <a:schemeClr val="tx1"/>
+          </a:fontRef>
+        </p:style>
+      </p:cxnSp>
+      <p:cxnSp>
+        <p:nvCxnSpPr>
+          <p:cNvPr id="191" name="직선 연결선 190">
+            <a:extLst>
+              <a:ext uri="{FF2B5EF4-FFF2-40B4-BE49-F238E27FC236}">
+                <a16:creationId xmlns:a16="http://schemas.microsoft.com/office/drawing/2014/main" id="{BDF85F1E-D490-4F93-9936-3C6C1D7370C9}"/>
+              </a:ext>
+            </a:extLst>
+          </p:cNvPr>
+          <p:cNvCxnSpPr>
+            <a:cxnSpLocks/>
+            <a:stCxn id="188" idx="6"/>
+            <a:endCxn id="185" idx="2"/>
+          </p:cNvCxnSpPr>
+          <p:nvPr/>
+        </p:nvCxnSpPr>
+        <p:spPr>
+          <a:xfrm flipV="1">
+            <a:off x="4783581" y="4770774"/>
+            <a:ext cx="277059" cy="22495"/>
+          </a:xfrm>
+          <a:prstGeom prst="line">
+            <a:avLst/>
+          </a:prstGeom>
+          <a:ln>
+            <a:solidFill>
+              <a:schemeClr val="tx1"/>
+            </a:solidFill>
+          </a:ln>
+        </p:spPr>
+        <p:style>
+          <a:lnRef idx="1">
+            <a:schemeClr val="accent1"/>
+          </a:lnRef>
+          <a:fillRef idx="0">
+            <a:schemeClr val="accent1"/>
+          </a:fillRef>
+          <a:effectRef idx="0">
+            <a:schemeClr val="accent1"/>
+          </a:effectRef>
+          <a:fontRef idx="minor">
+            <a:schemeClr val="tx1"/>
+          </a:fontRef>
+        </p:style>
+      </p:cxnSp>
+      <p:sp>
+        <p:nvSpPr>
+          <p:cNvPr id="192" name="TextBox 191">
+            <a:extLst>
+              <a:ext uri="{FF2B5EF4-FFF2-40B4-BE49-F238E27FC236}">
+                <a16:creationId xmlns:a16="http://schemas.microsoft.com/office/drawing/2014/main" id="{8E7FF971-628C-4F7F-B5AC-5E18CCDFD461}"/>
+              </a:ext>
+            </a:extLst>
+          </p:cNvPr>
+          <p:cNvSpPr txBox="1"/>
+          <p:nvPr/>
+        </p:nvSpPr>
+        <p:spPr>
+          <a:xfrm>
+            <a:off x="6989671" y="4743097"/>
+            <a:ext cx="905522" cy="369332"/>
+          </a:xfrm>
+          <a:prstGeom prst="rect">
+            <a:avLst/>
+          </a:prstGeom>
+          <a:noFill/>
+        </p:spPr>
+        <p:txBody>
+          <a:bodyPr wrap="square" rtlCol="0">
+            <a:spAutoFit/>
+          </a:bodyPr>
+          <a:lstStyle/>
+          <a:p>
+            <a:pPr algn="ctr"/>
+            <a:r>
+              <a:rPr lang="en-US" altLang="ko-KR" dirty="0"/>
+              <a:t>1F</a:t>
+            </a:r>
+            <a:endParaRPr lang="ko-KR" altLang="en-US" dirty="0"/>
+          </a:p>
+        </p:txBody>
+      </p:sp>
+      <p:sp>
+        <p:nvSpPr>
+          <p:cNvPr id="193" name="타원 192">
+            <a:extLst>
+              <a:ext uri="{FF2B5EF4-FFF2-40B4-BE49-F238E27FC236}">
+                <a16:creationId xmlns:a16="http://schemas.microsoft.com/office/drawing/2014/main" id="{56AA52C7-BE7D-47A1-87C4-70CF3DA1AEBB}"/>
+              </a:ext>
+            </a:extLst>
+          </p:cNvPr>
+          <p:cNvSpPr/>
+          <p:nvPr/>
+        </p:nvSpPr>
+        <p:spPr>
+          <a:xfrm>
+            <a:off x="4196885" y="4373821"/>
+            <a:ext cx="218114" cy="209724"/>
+          </a:xfrm>
+          <a:prstGeom prst="ellipse">
+            <a:avLst/>
+          </a:prstGeom>
+        </p:spPr>
+        <p:style>
+          <a:lnRef idx="2">
+            <a:schemeClr val="accent1">
+              <a:shade val="50000"/>
+            </a:schemeClr>
+          </a:lnRef>
+          <a:fillRef idx="1">
+            <a:schemeClr val="accent1"/>
+          </a:fillRef>
+          <a:effectRef idx="0">
+            <a:schemeClr val="accent1"/>
+          </a:effectRef>
+          <a:fontRef idx="minor">
+            <a:schemeClr val="lt1"/>
+          </a:fontRef>
+        </p:style>
+        <p:txBody>
+          <a:bodyPr rtlCol="0" anchor="ctr"/>
+          <a:lstStyle/>
+          <a:p>
+            <a:pPr algn="ctr"/>
+            <a:endParaRPr lang="ko-KR" altLang="en-US"/>
+          </a:p>
+        </p:txBody>
+      </p:sp>
+      <p:cxnSp>
+        <p:nvCxnSpPr>
+          <p:cNvPr id="194" name="직선 연결선 193">
+            <a:extLst>
+              <a:ext uri="{FF2B5EF4-FFF2-40B4-BE49-F238E27FC236}">
+                <a16:creationId xmlns:a16="http://schemas.microsoft.com/office/drawing/2014/main" id="{9FC6D79C-D302-4512-8301-57FFFF6D39A8}"/>
+              </a:ext>
+            </a:extLst>
+          </p:cNvPr>
+          <p:cNvCxnSpPr>
+            <a:cxnSpLocks/>
+            <a:stCxn id="193" idx="5"/>
+            <a:endCxn id="188" idx="1"/>
+          </p:cNvCxnSpPr>
+          <p:nvPr/>
+        </p:nvCxnSpPr>
+        <p:spPr>
+          <a:xfrm>
+            <a:off x="4383057" y="4552832"/>
+            <a:ext cx="145938" cy="131453"/>
+          </a:xfrm>
+          <a:prstGeom prst="line">
+            <a:avLst/>
+          </a:prstGeom>
+          <a:ln>
+            <a:solidFill>
+              <a:schemeClr val="tx1"/>
+            </a:solidFill>
+          </a:ln>
+        </p:spPr>
+        <p:style>
+          <a:lnRef idx="1">
+            <a:schemeClr val="accent1"/>
+          </a:lnRef>
+          <a:fillRef idx="0">
+            <a:schemeClr val="accent1"/>
+          </a:fillRef>
+          <a:effectRef idx="0">
+            <a:schemeClr val="accent1"/>
+          </a:effectRef>
+          <a:fontRef idx="minor">
+            <a:schemeClr val="tx1"/>
+          </a:fontRef>
+        </p:style>
+      </p:cxnSp>
+      <p:sp>
+        <p:nvSpPr>
+          <p:cNvPr id="195" name="타원 194">
+            <a:extLst>
+              <a:ext uri="{FF2B5EF4-FFF2-40B4-BE49-F238E27FC236}">
+                <a16:creationId xmlns:a16="http://schemas.microsoft.com/office/drawing/2014/main" id="{0DA20D24-F678-4922-8FB0-E4275BE01259}"/>
+              </a:ext>
+            </a:extLst>
+          </p:cNvPr>
+          <p:cNvSpPr/>
+          <p:nvPr/>
+        </p:nvSpPr>
+        <p:spPr>
+          <a:xfrm>
+            <a:off x="4164943" y="5004307"/>
+            <a:ext cx="218114" cy="209724"/>
+          </a:xfrm>
+          <a:prstGeom prst="ellipse">
+            <a:avLst/>
+          </a:prstGeom>
+        </p:spPr>
+        <p:style>
+          <a:lnRef idx="2">
+            <a:schemeClr val="accent1">
+              <a:shade val="50000"/>
+            </a:schemeClr>
+          </a:lnRef>
+          <a:fillRef idx="1">
+            <a:schemeClr val="accent1"/>
+          </a:fillRef>
+          <a:effectRef idx="0">
+            <a:schemeClr val="accent1"/>
+          </a:effectRef>
+          <a:fontRef idx="minor">
+            <a:schemeClr val="lt1"/>
+          </a:fontRef>
+        </p:style>
+        <p:txBody>
+          <a:bodyPr rtlCol="0" anchor="ctr"/>
+          <a:lstStyle/>
+          <a:p>
+            <a:pPr algn="ctr"/>
+            <a:endParaRPr lang="ko-KR" altLang="en-US"/>
+          </a:p>
+        </p:txBody>
+      </p:sp>
+      <p:cxnSp>
+        <p:nvCxnSpPr>
+          <p:cNvPr id="196" name="직선 연결선 195">
+            <a:extLst>
+              <a:ext uri="{FF2B5EF4-FFF2-40B4-BE49-F238E27FC236}">
+                <a16:creationId xmlns:a16="http://schemas.microsoft.com/office/drawing/2014/main" id="{348091B2-BCA6-44F2-B0E6-0E93AF019705}"/>
+              </a:ext>
+            </a:extLst>
+          </p:cNvPr>
+          <p:cNvCxnSpPr>
+            <a:cxnSpLocks/>
+            <a:stCxn id="195" idx="7"/>
+            <a:endCxn id="188" idx="3"/>
+          </p:cNvCxnSpPr>
+          <p:nvPr/>
+        </p:nvCxnSpPr>
+        <p:spPr>
+          <a:xfrm flipV="1">
+            <a:off x="4351115" y="4902253"/>
+            <a:ext cx="177880" cy="132767"/>
+          </a:xfrm>
+          <a:prstGeom prst="line">
+            <a:avLst/>
+          </a:prstGeom>
+          <a:ln>
+            <a:solidFill>
+              <a:schemeClr val="tx1"/>
+            </a:solidFill>
+          </a:ln>
+        </p:spPr>
+        <p:style>
+          <a:lnRef idx="1">
+            <a:schemeClr val="accent1"/>
+          </a:lnRef>
+          <a:fillRef idx="0">
+            <a:schemeClr val="accent1"/>
+          </a:fillRef>
+          <a:effectRef idx="0">
+            <a:schemeClr val="accent1"/>
+          </a:effectRef>
+          <a:fontRef idx="minor">
+            <a:schemeClr val="tx1"/>
+          </a:fontRef>
+        </p:style>
+      </p:cxnSp>
+      <p:sp>
+        <p:nvSpPr>
+          <p:cNvPr id="197" name="타원 196">
+            <a:extLst>
+              <a:ext uri="{FF2B5EF4-FFF2-40B4-BE49-F238E27FC236}">
+                <a16:creationId xmlns:a16="http://schemas.microsoft.com/office/drawing/2014/main" id="{85D66E51-6651-49A3-BB65-323D85AA68C6}"/>
+              </a:ext>
+            </a:extLst>
+          </p:cNvPr>
+          <p:cNvSpPr/>
+          <p:nvPr/>
+        </p:nvSpPr>
+        <p:spPr>
+          <a:xfrm>
+            <a:off x="4842526" y="5004307"/>
+            <a:ext cx="218114" cy="209724"/>
+          </a:xfrm>
+          <a:prstGeom prst="ellipse">
+            <a:avLst/>
+          </a:prstGeom>
+        </p:spPr>
+        <p:style>
+          <a:lnRef idx="2">
+            <a:schemeClr val="accent1">
+              <a:shade val="50000"/>
+            </a:schemeClr>
+          </a:lnRef>
+          <a:fillRef idx="1">
+            <a:schemeClr val="accent1"/>
+          </a:fillRef>
+          <a:effectRef idx="0">
+            <a:schemeClr val="accent1"/>
+          </a:effectRef>
+          <a:fontRef idx="minor">
+            <a:schemeClr val="lt1"/>
+          </a:fontRef>
+        </p:style>
+        <p:txBody>
+          <a:bodyPr rtlCol="0" anchor="ctr"/>
+          <a:lstStyle/>
+          <a:p>
+            <a:pPr algn="ctr"/>
+            <a:endParaRPr lang="ko-KR" altLang="en-US"/>
+          </a:p>
+        </p:txBody>
+      </p:sp>
+      <p:cxnSp>
+        <p:nvCxnSpPr>
+          <p:cNvPr id="198" name="직선 연결선 197">
+            <a:extLst>
+              <a:ext uri="{FF2B5EF4-FFF2-40B4-BE49-F238E27FC236}">
+                <a16:creationId xmlns:a16="http://schemas.microsoft.com/office/drawing/2014/main" id="{10993D59-4F12-49EB-8070-D7068AE20CD1}"/>
+              </a:ext>
+            </a:extLst>
+          </p:cNvPr>
+          <p:cNvCxnSpPr>
+            <a:cxnSpLocks/>
+            <a:stCxn id="197" idx="1"/>
+            <a:endCxn id="188" idx="5"/>
+          </p:cNvCxnSpPr>
+          <p:nvPr/>
+        </p:nvCxnSpPr>
+        <p:spPr>
+          <a:xfrm flipH="1" flipV="1">
+            <a:off x="4739901" y="4902253"/>
+            <a:ext cx="134567" cy="132767"/>
+          </a:xfrm>
+          <a:prstGeom prst="line">
+            <a:avLst/>
+          </a:prstGeom>
+          <a:ln>
+            <a:solidFill>
+              <a:schemeClr val="tx1"/>
+            </a:solidFill>
+          </a:ln>
+        </p:spPr>
+        <p:style>
+          <a:lnRef idx="1">
+            <a:schemeClr val="accent1"/>
+          </a:lnRef>
+          <a:fillRef idx="0">
+            <a:schemeClr val="accent1"/>
+          </a:fillRef>
+          <a:effectRef idx="0">
+            <a:schemeClr val="accent1"/>
+          </a:effectRef>
+          <a:fontRef idx="minor">
+            <a:schemeClr val="tx1"/>
+          </a:fontRef>
+        </p:style>
+      </p:cxnSp>
+      <p:sp>
+        <p:nvSpPr>
+          <p:cNvPr id="199" name="타원 198">
+            <a:extLst>
+              <a:ext uri="{FF2B5EF4-FFF2-40B4-BE49-F238E27FC236}">
+                <a16:creationId xmlns:a16="http://schemas.microsoft.com/office/drawing/2014/main" id="{77A162FD-94B4-483F-B1B8-54F8D8E853E2}"/>
+              </a:ext>
+            </a:extLst>
+          </p:cNvPr>
+          <p:cNvSpPr/>
+          <p:nvPr/>
+        </p:nvSpPr>
+        <p:spPr>
+          <a:xfrm>
+            <a:off x="4605797" y="5496317"/>
+            <a:ext cx="298266" cy="308254"/>
+          </a:xfrm>
+          <a:prstGeom prst="ellipse">
+            <a:avLst/>
+          </a:prstGeom>
+          <a:solidFill>
+            <a:srgbClr val="FFC000"/>
+          </a:solidFill>
+        </p:spPr>
+        <p:style>
+          <a:lnRef idx="2">
+            <a:schemeClr val="accent1">
+              <a:shade val="50000"/>
+            </a:schemeClr>
+          </a:lnRef>
+          <a:fillRef idx="1">
+            <a:schemeClr val="accent1"/>
+          </a:fillRef>
+          <a:effectRef idx="0">
+            <a:schemeClr val="accent1"/>
+          </a:effectRef>
+          <a:fontRef idx="minor">
+            <a:schemeClr val="lt1"/>
+          </a:fontRef>
+        </p:style>
+        <p:txBody>
+          <a:bodyPr rtlCol="0" anchor="ctr"/>
+          <a:lstStyle/>
+          <a:p>
+            <a:pPr algn="ctr"/>
+            <a:r>
+              <a:rPr lang="en-US" altLang="ko-KR" dirty="0"/>
+              <a:t>B</a:t>
+            </a:r>
+            <a:endParaRPr lang="ko-KR" altLang="en-US" dirty="0"/>
+          </a:p>
+        </p:txBody>
+      </p:sp>
+      <p:cxnSp>
+        <p:nvCxnSpPr>
+          <p:cNvPr id="200" name="직선 연결선 199">
+            <a:extLst>
+              <a:ext uri="{FF2B5EF4-FFF2-40B4-BE49-F238E27FC236}">
+                <a16:creationId xmlns:a16="http://schemas.microsoft.com/office/drawing/2014/main" id="{A1AB0490-80DE-495F-A230-A1DC8F461442}"/>
+              </a:ext>
+            </a:extLst>
+          </p:cNvPr>
+          <p:cNvCxnSpPr>
+            <a:cxnSpLocks/>
+            <a:stCxn id="199" idx="0"/>
+            <a:endCxn id="188" idx="4"/>
+          </p:cNvCxnSpPr>
+          <p:nvPr/>
+        </p:nvCxnSpPr>
+        <p:spPr>
+          <a:xfrm flipH="1" flipV="1">
+            <a:off x="4634448" y="4947396"/>
+            <a:ext cx="120482" cy="548921"/>
+          </a:xfrm>
+          <a:prstGeom prst="line">
+            <a:avLst/>
+          </a:prstGeom>
+          <a:ln>
+            <a:solidFill>
+              <a:schemeClr val="tx1"/>
+            </a:solidFill>
+          </a:ln>
+        </p:spPr>
+        <p:style>
+          <a:lnRef idx="1">
+            <a:schemeClr val="accent1"/>
+          </a:lnRef>
+          <a:fillRef idx="0">
+            <a:schemeClr val="accent1"/>
+          </a:fillRef>
+          <a:effectRef idx="0">
+            <a:schemeClr val="accent1"/>
+          </a:effectRef>
+          <a:fontRef idx="minor">
+            <a:schemeClr val="tx1"/>
+          </a:fontRef>
+        </p:style>
+      </p:cxnSp>
+      <p:sp>
+        <p:nvSpPr>
+          <p:cNvPr id="201" name="타원 200">
+            <a:extLst>
+              <a:ext uri="{FF2B5EF4-FFF2-40B4-BE49-F238E27FC236}">
+                <a16:creationId xmlns:a16="http://schemas.microsoft.com/office/drawing/2014/main" id="{2FD68AFC-10A3-476F-A2B6-96CBD0B7247D}"/>
+              </a:ext>
+            </a:extLst>
+          </p:cNvPr>
+          <p:cNvSpPr/>
+          <p:nvPr/>
+        </p:nvSpPr>
+        <p:spPr>
+          <a:xfrm>
+            <a:off x="5060640" y="5826103"/>
+            <a:ext cx="218114" cy="209724"/>
+          </a:xfrm>
+          <a:prstGeom prst="ellipse">
+            <a:avLst/>
+          </a:prstGeom>
+        </p:spPr>
+        <p:style>
+          <a:lnRef idx="2">
+            <a:schemeClr val="accent1">
+              <a:shade val="50000"/>
+            </a:schemeClr>
+          </a:lnRef>
+          <a:fillRef idx="1">
+            <a:schemeClr val="accent1"/>
+          </a:fillRef>
+          <a:effectRef idx="0">
+            <a:schemeClr val="accent1"/>
+          </a:effectRef>
+          <a:fontRef idx="minor">
+            <a:schemeClr val="lt1"/>
+          </a:fontRef>
+        </p:style>
+        <p:txBody>
+          <a:bodyPr rtlCol="0" anchor="ctr"/>
+          <a:lstStyle/>
+          <a:p>
+            <a:pPr algn="ctr"/>
+            <a:endParaRPr lang="ko-KR" altLang="en-US"/>
+          </a:p>
+        </p:txBody>
+      </p:sp>
+      <p:cxnSp>
+        <p:nvCxnSpPr>
+          <p:cNvPr id="202" name="직선 연결선 201">
+            <a:extLst>
+              <a:ext uri="{FF2B5EF4-FFF2-40B4-BE49-F238E27FC236}">
+                <a16:creationId xmlns:a16="http://schemas.microsoft.com/office/drawing/2014/main" id="{3FD0FA3E-A8F6-4BFE-B0E0-408EC85DE96A}"/>
+              </a:ext>
+            </a:extLst>
+          </p:cNvPr>
+          <p:cNvCxnSpPr>
+            <a:cxnSpLocks/>
+            <a:stCxn id="201" idx="1"/>
+            <a:endCxn id="199" idx="5"/>
+          </p:cNvCxnSpPr>
+          <p:nvPr/>
+        </p:nvCxnSpPr>
+        <p:spPr>
+          <a:xfrm flipH="1" flipV="1">
+            <a:off x="4860383" y="5759428"/>
+            <a:ext cx="232199" cy="97388"/>
+          </a:xfrm>
+          <a:prstGeom prst="line">
+            <a:avLst/>
+          </a:prstGeom>
+          <a:ln>
+            <a:solidFill>
+              <a:schemeClr val="tx1"/>
+            </a:solidFill>
+          </a:ln>
+        </p:spPr>
+        <p:style>
+          <a:lnRef idx="1">
+            <a:schemeClr val="accent1"/>
+          </a:lnRef>
+          <a:fillRef idx="0">
+            <a:schemeClr val="accent1"/>
+          </a:fillRef>
+          <a:effectRef idx="0">
+            <a:schemeClr val="accent1"/>
+          </a:effectRef>
+          <a:fontRef idx="minor">
+            <a:schemeClr val="tx1"/>
+          </a:fontRef>
+        </p:style>
+      </p:cxnSp>
+      <p:sp>
+        <p:nvSpPr>
+          <p:cNvPr id="203" name="타원 202">
+            <a:extLst>
+              <a:ext uri="{FF2B5EF4-FFF2-40B4-BE49-F238E27FC236}">
+                <a16:creationId xmlns:a16="http://schemas.microsoft.com/office/drawing/2014/main" id="{29E8D3F2-F13D-445F-A9B9-54CC090DAD41}"/>
+              </a:ext>
+            </a:extLst>
+          </p:cNvPr>
+          <p:cNvSpPr/>
+          <p:nvPr/>
+        </p:nvSpPr>
+        <p:spPr>
+          <a:xfrm>
+            <a:off x="4387683" y="5847238"/>
+            <a:ext cx="218114" cy="209724"/>
+          </a:xfrm>
+          <a:prstGeom prst="ellipse">
+            <a:avLst/>
+          </a:prstGeom>
+        </p:spPr>
+        <p:style>
+          <a:lnRef idx="2">
+            <a:schemeClr val="accent1">
+              <a:shade val="50000"/>
+            </a:schemeClr>
+          </a:lnRef>
+          <a:fillRef idx="1">
+            <a:schemeClr val="accent1"/>
+          </a:fillRef>
+          <a:effectRef idx="0">
+            <a:schemeClr val="accent1"/>
+          </a:effectRef>
+          <a:fontRef idx="minor">
+            <a:schemeClr val="lt1"/>
+          </a:fontRef>
+        </p:style>
+        <p:txBody>
+          <a:bodyPr rtlCol="0" anchor="ctr"/>
+          <a:lstStyle/>
+          <a:p>
+            <a:pPr algn="ctr"/>
+            <a:endParaRPr lang="ko-KR" altLang="en-US"/>
+          </a:p>
+        </p:txBody>
+      </p:sp>
+      <p:cxnSp>
+        <p:nvCxnSpPr>
+          <p:cNvPr id="204" name="직선 연결선 203">
+            <a:extLst>
+              <a:ext uri="{FF2B5EF4-FFF2-40B4-BE49-F238E27FC236}">
+                <a16:creationId xmlns:a16="http://schemas.microsoft.com/office/drawing/2014/main" id="{CBDC447C-C14A-47CA-B165-E30C5BBF40B4}"/>
+              </a:ext>
+            </a:extLst>
+          </p:cNvPr>
+          <p:cNvCxnSpPr>
+            <a:cxnSpLocks/>
+            <a:stCxn id="203" idx="7"/>
+            <a:endCxn id="199" idx="3"/>
+          </p:cNvCxnSpPr>
+          <p:nvPr/>
+        </p:nvCxnSpPr>
+        <p:spPr>
+          <a:xfrm flipV="1">
+            <a:off x="4573855" y="5759428"/>
+            <a:ext cx="75622" cy="118523"/>
+          </a:xfrm>
+          <a:prstGeom prst="line">
+            <a:avLst/>
+          </a:prstGeom>
+          <a:ln>
+            <a:solidFill>
+              <a:schemeClr val="tx1"/>
+            </a:solidFill>
+          </a:ln>
+        </p:spPr>
+        <p:style>
+          <a:lnRef idx="1">
+            <a:schemeClr val="accent1"/>
+          </a:lnRef>
+          <a:fillRef idx="0">
+            <a:schemeClr val="accent1"/>
+          </a:fillRef>
+          <a:effectRef idx="0">
+            <a:schemeClr val="accent1"/>
+          </a:effectRef>
+          <a:fontRef idx="minor">
+            <a:schemeClr val="tx1"/>
+          </a:fontRef>
+        </p:style>
+      </p:cxnSp>
+      <p:sp>
+        <p:nvSpPr>
+          <p:cNvPr id="205" name="타원 204">
+            <a:extLst>
+              <a:ext uri="{FF2B5EF4-FFF2-40B4-BE49-F238E27FC236}">
+                <a16:creationId xmlns:a16="http://schemas.microsoft.com/office/drawing/2014/main" id="{EF9FF3E1-6450-4F69-8933-1FB2583CFC3D}"/>
+              </a:ext>
+            </a:extLst>
+          </p:cNvPr>
+          <p:cNvSpPr/>
+          <p:nvPr/>
+        </p:nvSpPr>
+        <p:spPr>
+          <a:xfrm>
+            <a:off x="4161748" y="5456997"/>
+            <a:ext cx="218114" cy="209724"/>
+          </a:xfrm>
+          <a:prstGeom prst="ellipse">
+            <a:avLst/>
+          </a:prstGeom>
+        </p:spPr>
+        <p:style>
+          <a:lnRef idx="2">
+            <a:schemeClr val="accent1">
+              <a:shade val="50000"/>
+            </a:schemeClr>
+          </a:lnRef>
+          <a:fillRef idx="1">
+            <a:schemeClr val="accent1"/>
+          </a:fillRef>
+          <a:effectRef idx="0">
+            <a:schemeClr val="accent1"/>
+          </a:effectRef>
+          <a:fontRef idx="minor">
+            <a:schemeClr val="lt1"/>
+          </a:fontRef>
+        </p:style>
+        <p:txBody>
+          <a:bodyPr rtlCol="0" anchor="ctr"/>
+          <a:lstStyle/>
+          <a:p>
+            <a:pPr algn="ctr"/>
+            <a:endParaRPr lang="ko-KR" altLang="en-US"/>
+          </a:p>
+        </p:txBody>
+      </p:sp>
+      <p:cxnSp>
+        <p:nvCxnSpPr>
+          <p:cNvPr id="206" name="직선 연결선 205">
+            <a:extLst>
+              <a:ext uri="{FF2B5EF4-FFF2-40B4-BE49-F238E27FC236}">
+                <a16:creationId xmlns:a16="http://schemas.microsoft.com/office/drawing/2014/main" id="{306D69B2-36CA-45EF-B4C2-C262B673B6C4}"/>
+              </a:ext>
+            </a:extLst>
+          </p:cNvPr>
+          <p:cNvCxnSpPr>
+            <a:cxnSpLocks/>
+            <a:stCxn id="205" idx="6"/>
+            <a:endCxn id="199" idx="2"/>
+          </p:cNvCxnSpPr>
+          <p:nvPr/>
+        </p:nvCxnSpPr>
+        <p:spPr>
+          <a:xfrm>
+            <a:off x="4379862" y="5561859"/>
+            <a:ext cx="225935" cy="88585"/>
+          </a:xfrm>
+          <a:prstGeom prst="line">
+            <a:avLst/>
+          </a:prstGeom>
+          <a:ln>
+            <a:solidFill>
+              <a:schemeClr val="tx1"/>
+            </a:solidFill>
+          </a:ln>
+        </p:spPr>
+        <p:style>
+          <a:lnRef idx="1">
+            <a:schemeClr val="accent1"/>
+          </a:lnRef>
+          <a:fillRef idx="0">
+            <a:schemeClr val="accent1"/>
+          </a:fillRef>
+          <a:effectRef idx="0">
+            <a:schemeClr val="accent1"/>
+          </a:effectRef>
+          <a:fontRef idx="minor">
+            <a:schemeClr val="tx1"/>
+          </a:fontRef>
+        </p:style>
+      </p:cxnSp>
+      <p:sp>
+        <p:nvSpPr>
+          <p:cNvPr id="207" name="타원 206">
+            <a:extLst>
+              <a:ext uri="{FF2B5EF4-FFF2-40B4-BE49-F238E27FC236}">
+                <a16:creationId xmlns:a16="http://schemas.microsoft.com/office/drawing/2014/main" id="{79853E19-73CF-4560-8F0A-26B76EB91645}"/>
+              </a:ext>
+            </a:extLst>
+          </p:cNvPr>
+          <p:cNvSpPr/>
+          <p:nvPr/>
+        </p:nvSpPr>
+        <p:spPr>
+          <a:xfrm>
+            <a:off x="5797734" y="5059904"/>
+            <a:ext cx="298266" cy="308254"/>
+          </a:xfrm>
+          <a:prstGeom prst="ellipse">
+            <a:avLst/>
+          </a:prstGeom>
+          <a:solidFill>
+            <a:srgbClr val="FFC000"/>
+          </a:solidFill>
+        </p:spPr>
+        <p:style>
+          <a:lnRef idx="2">
+            <a:schemeClr val="accent1">
+              <a:shade val="50000"/>
+            </a:schemeClr>
+          </a:lnRef>
+          <a:fillRef idx="1">
+            <a:schemeClr val="accent1"/>
+          </a:fillRef>
+          <a:effectRef idx="0">
+            <a:schemeClr val="accent1"/>
+          </a:effectRef>
+          <a:fontRef idx="minor">
+            <a:schemeClr val="lt1"/>
+          </a:fontRef>
+        </p:style>
+        <p:txBody>
+          <a:bodyPr rtlCol="0" anchor="ctr"/>
+          <a:lstStyle/>
+          <a:p>
+            <a:pPr algn="ctr"/>
+            <a:r>
+              <a:rPr lang="en-US" altLang="ko-KR" dirty="0"/>
+              <a:t>C</a:t>
+            </a:r>
+            <a:endParaRPr lang="ko-KR" altLang="en-US" dirty="0"/>
+          </a:p>
+        </p:txBody>
+      </p:sp>
+      <p:cxnSp>
+        <p:nvCxnSpPr>
+          <p:cNvPr id="208" name="직선 연결선 207">
+            <a:extLst>
+              <a:ext uri="{FF2B5EF4-FFF2-40B4-BE49-F238E27FC236}">
+                <a16:creationId xmlns:a16="http://schemas.microsoft.com/office/drawing/2014/main" id="{AD355AE4-602A-4372-84BB-86A275D3A9A6}"/>
+              </a:ext>
+            </a:extLst>
+          </p:cNvPr>
+          <p:cNvCxnSpPr>
+            <a:cxnSpLocks/>
+            <a:stCxn id="199" idx="6"/>
+            <a:endCxn id="207" idx="3"/>
+          </p:cNvCxnSpPr>
+          <p:nvPr/>
+        </p:nvCxnSpPr>
+        <p:spPr>
+          <a:xfrm flipV="1">
+            <a:off x="4904063" y="5323015"/>
+            <a:ext cx="937351" cy="327429"/>
+          </a:xfrm>
+          <a:prstGeom prst="line">
+            <a:avLst/>
+          </a:prstGeom>
+          <a:ln>
+            <a:solidFill>
+              <a:schemeClr val="tx1"/>
+            </a:solidFill>
+          </a:ln>
+        </p:spPr>
+        <p:style>
+          <a:lnRef idx="1">
+            <a:schemeClr val="accent1"/>
+          </a:lnRef>
+          <a:fillRef idx="0">
+            <a:schemeClr val="accent1"/>
+          </a:fillRef>
+          <a:effectRef idx="0">
+            <a:schemeClr val="accent1"/>
+          </a:effectRef>
+          <a:fontRef idx="minor">
+            <a:schemeClr val="tx1"/>
+          </a:fontRef>
+        </p:style>
+      </p:cxnSp>
+      <p:cxnSp>
+        <p:nvCxnSpPr>
+          <p:cNvPr id="209" name="직선 연결선 208">
+            <a:extLst>
+              <a:ext uri="{FF2B5EF4-FFF2-40B4-BE49-F238E27FC236}">
+                <a16:creationId xmlns:a16="http://schemas.microsoft.com/office/drawing/2014/main" id="{B40DC0B5-3BA3-4BB1-A150-5AA55E59B6BB}"/>
+              </a:ext>
+            </a:extLst>
+          </p:cNvPr>
+          <p:cNvCxnSpPr>
+            <a:cxnSpLocks/>
+            <a:endCxn id="207" idx="1"/>
+          </p:cNvCxnSpPr>
+          <p:nvPr/>
+        </p:nvCxnSpPr>
+        <p:spPr>
+          <a:xfrm>
+            <a:off x="4783581" y="4843810"/>
+            <a:ext cx="1057833" cy="261237"/>
+          </a:xfrm>
+          <a:prstGeom prst="line">
+            <a:avLst/>
+          </a:prstGeom>
+          <a:ln>
+            <a:solidFill>
+              <a:schemeClr val="tx1"/>
+            </a:solidFill>
+          </a:ln>
+        </p:spPr>
+        <p:style>
+          <a:lnRef idx="1">
+            <a:schemeClr val="accent1"/>
+          </a:lnRef>
+          <a:fillRef idx="0">
+            <a:schemeClr val="accent1"/>
+          </a:fillRef>
+          <a:effectRef idx="0">
+            <a:schemeClr val="accent1"/>
+          </a:effectRef>
+          <a:fontRef idx="minor">
+            <a:schemeClr val="tx1"/>
+          </a:fontRef>
+        </p:style>
+      </p:cxnSp>
+      <p:sp>
+        <p:nvSpPr>
+          <p:cNvPr id="210" name="타원 209">
+            <a:extLst>
+              <a:ext uri="{FF2B5EF4-FFF2-40B4-BE49-F238E27FC236}">
+                <a16:creationId xmlns:a16="http://schemas.microsoft.com/office/drawing/2014/main" id="{AB6B8DEE-60F9-484F-A446-9F37AC4D491C}"/>
+              </a:ext>
+            </a:extLst>
+          </p:cNvPr>
+          <p:cNvSpPr/>
+          <p:nvPr/>
+        </p:nvSpPr>
+        <p:spPr>
+          <a:xfrm>
+            <a:off x="6373286" y="5050967"/>
+            <a:ext cx="218114" cy="209724"/>
+          </a:xfrm>
+          <a:prstGeom prst="ellipse">
+            <a:avLst/>
+          </a:prstGeom>
+        </p:spPr>
+        <p:style>
+          <a:lnRef idx="2">
+            <a:schemeClr val="accent1">
+              <a:shade val="50000"/>
+            </a:schemeClr>
+          </a:lnRef>
+          <a:fillRef idx="1">
+            <a:schemeClr val="accent1"/>
+          </a:fillRef>
+          <a:effectRef idx="0">
+            <a:schemeClr val="accent1"/>
+          </a:effectRef>
+          <a:fontRef idx="minor">
+            <a:schemeClr val="lt1"/>
+          </a:fontRef>
+        </p:style>
+        <p:txBody>
+          <a:bodyPr rtlCol="0" anchor="ctr"/>
+          <a:lstStyle/>
+          <a:p>
+            <a:pPr algn="ctr"/>
+            <a:endParaRPr lang="ko-KR" altLang="en-US"/>
+          </a:p>
+        </p:txBody>
+      </p:sp>
+      <p:sp>
+        <p:nvSpPr>
+          <p:cNvPr id="211" name="타원 210">
+            <a:extLst>
+              <a:ext uri="{FF2B5EF4-FFF2-40B4-BE49-F238E27FC236}">
+                <a16:creationId xmlns:a16="http://schemas.microsoft.com/office/drawing/2014/main" id="{83934830-FCA1-4FE5-AD1F-4BA715890F52}"/>
+              </a:ext>
+            </a:extLst>
+          </p:cNvPr>
+          <p:cNvSpPr/>
+          <p:nvPr/>
+        </p:nvSpPr>
+        <p:spPr>
+          <a:xfrm>
+            <a:off x="6136459" y="4742929"/>
+            <a:ext cx="218114" cy="209724"/>
+          </a:xfrm>
+          <a:prstGeom prst="ellipse">
+            <a:avLst/>
+          </a:prstGeom>
+        </p:spPr>
+        <p:style>
+          <a:lnRef idx="2">
+            <a:schemeClr val="accent1">
+              <a:shade val="50000"/>
+            </a:schemeClr>
+          </a:lnRef>
+          <a:fillRef idx="1">
+            <a:schemeClr val="accent1"/>
+          </a:fillRef>
+          <a:effectRef idx="0">
+            <a:schemeClr val="accent1"/>
+          </a:effectRef>
+          <a:fontRef idx="minor">
+            <a:schemeClr val="lt1"/>
+          </a:fontRef>
+        </p:style>
+        <p:txBody>
+          <a:bodyPr rtlCol="0" anchor="ctr"/>
+          <a:lstStyle/>
+          <a:p>
+            <a:pPr algn="ctr"/>
+            <a:endParaRPr lang="ko-KR" altLang="en-US"/>
+          </a:p>
+        </p:txBody>
+      </p:sp>
+      <p:cxnSp>
+        <p:nvCxnSpPr>
+          <p:cNvPr id="212" name="직선 연결선 211">
+            <a:extLst>
+              <a:ext uri="{FF2B5EF4-FFF2-40B4-BE49-F238E27FC236}">
+                <a16:creationId xmlns:a16="http://schemas.microsoft.com/office/drawing/2014/main" id="{5E5E29BE-67AD-449E-8639-D8E92F831C53}"/>
+              </a:ext>
+            </a:extLst>
+          </p:cNvPr>
+          <p:cNvCxnSpPr>
+            <a:cxnSpLocks/>
+            <a:stCxn id="207" idx="7"/>
+            <a:endCxn id="211" idx="3"/>
+          </p:cNvCxnSpPr>
+          <p:nvPr/>
+        </p:nvCxnSpPr>
+        <p:spPr>
+          <a:xfrm flipV="1">
+            <a:off x="6052320" y="4921940"/>
+            <a:ext cx="116081" cy="183107"/>
+          </a:xfrm>
+          <a:prstGeom prst="line">
+            <a:avLst/>
+          </a:prstGeom>
+          <a:ln>
+            <a:solidFill>
+              <a:schemeClr val="tx1"/>
+            </a:solidFill>
+          </a:ln>
+        </p:spPr>
+        <p:style>
+          <a:lnRef idx="1">
+            <a:schemeClr val="accent1"/>
+          </a:lnRef>
+          <a:fillRef idx="0">
+            <a:schemeClr val="accent1"/>
+          </a:fillRef>
+          <a:effectRef idx="0">
+            <a:schemeClr val="accent1"/>
+          </a:effectRef>
+          <a:fontRef idx="minor">
+            <a:schemeClr val="tx1"/>
+          </a:fontRef>
+        </p:style>
+      </p:cxnSp>
+      <p:sp>
+        <p:nvSpPr>
+          <p:cNvPr id="213" name="타원 212">
+            <a:extLst>
+              <a:ext uri="{FF2B5EF4-FFF2-40B4-BE49-F238E27FC236}">
+                <a16:creationId xmlns:a16="http://schemas.microsoft.com/office/drawing/2014/main" id="{D398E33C-8A6E-4C75-8395-CE80A318BD91}"/>
+              </a:ext>
+            </a:extLst>
+          </p:cNvPr>
+          <p:cNvSpPr/>
+          <p:nvPr/>
+        </p:nvSpPr>
+        <p:spPr>
+          <a:xfrm>
+            <a:off x="5666360" y="4712216"/>
+            <a:ext cx="218114" cy="209724"/>
+          </a:xfrm>
+          <a:prstGeom prst="ellipse">
+            <a:avLst/>
+          </a:prstGeom>
+        </p:spPr>
+        <p:style>
+          <a:lnRef idx="2">
+            <a:schemeClr val="accent1">
+              <a:shade val="50000"/>
+            </a:schemeClr>
+          </a:lnRef>
+          <a:fillRef idx="1">
+            <a:schemeClr val="accent1"/>
+          </a:fillRef>
+          <a:effectRef idx="0">
+            <a:schemeClr val="accent1"/>
+          </a:effectRef>
+          <a:fontRef idx="minor">
+            <a:schemeClr val="lt1"/>
+          </a:fontRef>
+        </p:style>
+        <p:txBody>
+          <a:bodyPr rtlCol="0" anchor="ctr"/>
+          <a:lstStyle/>
+          <a:p>
+            <a:pPr algn="ctr"/>
+            <a:endParaRPr lang="ko-KR" altLang="en-US"/>
+          </a:p>
+        </p:txBody>
+      </p:sp>
+      <p:cxnSp>
+        <p:nvCxnSpPr>
+          <p:cNvPr id="214" name="직선 연결선 213">
+            <a:extLst>
+              <a:ext uri="{FF2B5EF4-FFF2-40B4-BE49-F238E27FC236}">
+                <a16:creationId xmlns:a16="http://schemas.microsoft.com/office/drawing/2014/main" id="{0258509A-CD0E-43C1-BB0E-8D0678FD3668}"/>
+              </a:ext>
+            </a:extLst>
+          </p:cNvPr>
+          <p:cNvCxnSpPr>
+            <a:cxnSpLocks/>
+            <a:stCxn id="213" idx="5"/>
+            <a:endCxn id="207" idx="0"/>
+          </p:cNvCxnSpPr>
+          <p:nvPr/>
+        </p:nvCxnSpPr>
+        <p:spPr>
+          <a:xfrm>
+            <a:off x="5852532" y="4891227"/>
+            <a:ext cx="94335" cy="168677"/>
+          </a:xfrm>
+          <a:prstGeom prst="line">
+            <a:avLst/>
+          </a:prstGeom>
+          <a:ln>
+            <a:solidFill>
+              <a:schemeClr val="tx1"/>
+            </a:solidFill>
+          </a:ln>
+        </p:spPr>
+        <p:style>
+          <a:lnRef idx="1">
+            <a:schemeClr val="accent1"/>
+          </a:lnRef>
+          <a:fillRef idx="0">
+            <a:schemeClr val="accent1"/>
+          </a:fillRef>
+          <a:effectRef idx="0">
+            <a:schemeClr val="accent1"/>
+          </a:effectRef>
+          <a:fontRef idx="minor">
+            <a:schemeClr val="tx1"/>
+          </a:fontRef>
+        </p:style>
+      </p:cxnSp>
+      <p:sp>
+        <p:nvSpPr>
+          <p:cNvPr id="215" name="타원 214">
+            <a:extLst>
+              <a:ext uri="{FF2B5EF4-FFF2-40B4-BE49-F238E27FC236}">
+                <a16:creationId xmlns:a16="http://schemas.microsoft.com/office/drawing/2014/main" id="{C633761E-ABA4-4100-AF0E-2E9D116A5A74}"/>
+              </a:ext>
+            </a:extLst>
+          </p:cNvPr>
+          <p:cNvSpPr/>
+          <p:nvPr/>
+        </p:nvSpPr>
+        <p:spPr>
+          <a:xfrm>
+            <a:off x="6169302" y="5373415"/>
+            <a:ext cx="218114" cy="209724"/>
+          </a:xfrm>
+          <a:prstGeom prst="ellipse">
+            <a:avLst/>
+          </a:prstGeom>
+        </p:spPr>
+        <p:style>
+          <a:lnRef idx="2">
+            <a:schemeClr val="accent1">
+              <a:shade val="50000"/>
+            </a:schemeClr>
+          </a:lnRef>
+          <a:fillRef idx="1">
+            <a:schemeClr val="accent1"/>
+          </a:fillRef>
+          <a:effectRef idx="0">
+            <a:schemeClr val="accent1"/>
+          </a:effectRef>
+          <a:fontRef idx="minor">
+            <a:schemeClr val="lt1"/>
+          </a:fontRef>
+        </p:style>
+        <p:txBody>
+          <a:bodyPr rtlCol="0" anchor="ctr"/>
+          <a:lstStyle/>
+          <a:p>
+            <a:pPr algn="ctr"/>
+            <a:endParaRPr lang="ko-KR" altLang="en-US"/>
+          </a:p>
+        </p:txBody>
+      </p:sp>
+      <p:cxnSp>
+        <p:nvCxnSpPr>
+          <p:cNvPr id="216" name="직선 연결선 215">
+            <a:extLst>
+              <a:ext uri="{FF2B5EF4-FFF2-40B4-BE49-F238E27FC236}">
+                <a16:creationId xmlns:a16="http://schemas.microsoft.com/office/drawing/2014/main" id="{12428496-A7B3-49F6-A1C9-565903980D3F}"/>
+              </a:ext>
+            </a:extLst>
+          </p:cNvPr>
+          <p:cNvCxnSpPr>
+            <a:cxnSpLocks/>
+            <a:stCxn id="215" idx="1"/>
+            <a:endCxn id="207" idx="5"/>
+          </p:cNvCxnSpPr>
+          <p:nvPr/>
+        </p:nvCxnSpPr>
+        <p:spPr>
+          <a:xfrm flipH="1" flipV="1">
+            <a:off x="6052320" y="5323015"/>
+            <a:ext cx="148924" cy="81113"/>
+          </a:xfrm>
+          <a:prstGeom prst="line">
+            <a:avLst/>
+          </a:prstGeom>
+          <a:ln>
+            <a:solidFill>
+              <a:schemeClr val="tx1"/>
+            </a:solidFill>
+          </a:ln>
+        </p:spPr>
+        <p:style>
+          <a:lnRef idx="1">
+            <a:schemeClr val="accent1"/>
+          </a:lnRef>
+          <a:fillRef idx="0">
+            <a:schemeClr val="accent1"/>
+          </a:fillRef>
+          <a:effectRef idx="0">
+            <a:schemeClr val="accent1"/>
+          </a:effectRef>
+          <a:fontRef idx="minor">
+            <a:schemeClr val="tx1"/>
+          </a:fontRef>
+        </p:style>
+      </p:cxnSp>
+      <p:cxnSp>
+        <p:nvCxnSpPr>
+          <p:cNvPr id="217" name="직선 연결선 216">
+            <a:extLst>
+              <a:ext uri="{FF2B5EF4-FFF2-40B4-BE49-F238E27FC236}">
+                <a16:creationId xmlns:a16="http://schemas.microsoft.com/office/drawing/2014/main" id="{1F37B04B-51FC-49D5-82C1-B54FC7CA0485}"/>
+              </a:ext>
+            </a:extLst>
+          </p:cNvPr>
+          <p:cNvCxnSpPr>
+            <a:cxnSpLocks/>
+            <a:stCxn id="207" idx="6"/>
+            <a:endCxn id="210" idx="2"/>
+          </p:cNvCxnSpPr>
+          <p:nvPr/>
+        </p:nvCxnSpPr>
+        <p:spPr>
+          <a:xfrm flipV="1">
+            <a:off x="6096000" y="5155829"/>
+            <a:ext cx="277286" cy="58202"/>
+          </a:xfrm>
+          <a:prstGeom prst="line">
+            <a:avLst/>
+          </a:prstGeom>
+          <a:ln>
+            <a:solidFill>
+              <a:schemeClr val="tx1"/>
+            </a:solidFill>
+          </a:ln>
+        </p:spPr>
+        <p:style>
+          <a:lnRef idx="1">
+            <a:schemeClr val="accent1"/>
+          </a:lnRef>
+          <a:fillRef idx="0">
+            <a:schemeClr val="accent1"/>
+          </a:fillRef>
+          <a:effectRef idx="0">
+            <a:schemeClr val="accent1"/>
+          </a:effectRef>
+          <a:fontRef idx="minor">
+            <a:schemeClr val="tx1"/>
+          </a:fontRef>
+        </p:style>
+      </p:cxnSp>
+      <p:sp>
+        <p:nvSpPr>
+          <p:cNvPr id="218" name="타원 217">
+            <a:extLst>
+              <a:ext uri="{FF2B5EF4-FFF2-40B4-BE49-F238E27FC236}">
+                <a16:creationId xmlns:a16="http://schemas.microsoft.com/office/drawing/2014/main" id="{565A98D4-70E3-4B3F-A9C7-F4176BACE9F6}"/>
+              </a:ext>
+            </a:extLst>
+          </p:cNvPr>
+          <p:cNvSpPr/>
+          <p:nvPr/>
+        </p:nvSpPr>
+        <p:spPr>
+          <a:xfrm>
+            <a:off x="5804585" y="5549704"/>
+            <a:ext cx="218114" cy="209724"/>
+          </a:xfrm>
+          <a:prstGeom prst="ellipse">
+            <a:avLst/>
+          </a:prstGeom>
+        </p:spPr>
+        <p:style>
+          <a:lnRef idx="2">
+            <a:schemeClr val="accent1">
+              <a:shade val="50000"/>
+            </a:schemeClr>
+          </a:lnRef>
+          <a:fillRef idx="1">
+            <a:schemeClr val="accent1"/>
+          </a:fillRef>
+          <a:effectRef idx="0">
+            <a:schemeClr val="accent1"/>
+          </a:effectRef>
+          <a:fontRef idx="minor">
+            <a:schemeClr val="lt1"/>
+          </a:fontRef>
+        </p:style>
+        <p:txBody>
+          <a:bodyPr rtlCol="0" anchor="ctr"/>
+          <a:lstStyle/>
+          <a:p>
+            <a:pPr algn="ctr"/>
+            <a:endParaRPr lang="ko-KR" altLang="en-US"/>
+          </a:p>
+        </p:txBody>
+      </p:sp>
+      <p:cxnSp>
+        <p:nvCxnSpPr>
+          <p:cNvPr id="219" name="직선 연결선 218">
+            <a:extLst>
+              <a:ext uri="{FF2B5EF4-FFF2-40B4-BE49-F238E27FC236}">
+                <a16:creationId xmlns:a16="http://schemas.microsoft.com/office/drawing/2014/main" id="{DD9F9807-E654-4FCC-BF1D-290D98AA7A61}"/>
+              </a:ext>
+            </a:extLst>
+          </p:cNvPr>
+          <p:cNvCxnSpPr>
+            <a:cxnSpLocks/>
+            <a:stCxn id="207" idx="4"/>
+            <a:endCxn id="218" idx="0"/>
+          </p:cNvCxnSpPr>
+          <p:nvPr/>
+        </p:nvCxnSpPr>
+        <p:spPr>
+          <a:xfrm flipH="1">
+            <a:off x="5913642" y="5368158"/>
+            <a:ext cx="33225" cy="181546"/>
+          </a:xfrm>
+          <a:prstGeom prst="line">
+            <a:avLst/>
+          </a:prstGeom>
+          <a:ln>
+            <a:solidFill>
+              <a:schemeClr val="tx1"/>
+            </a:solidFill>
+          </a:ln>
+        </p:spPr>
+        <p:style>
+          <a:lnRef idx="1">
+            <a:schemeClr val="accent1"/>
+          </a:lnRef>
+          <a:fillRef idx="0">
+            <a:schemeClr val="accent1"/>
+          </a:fillRef>
+          <a:effectRef idx="0">
+            <a:schemeClr val="accent1"/>
+          </a:effectRef>
+          <a:fontRef idx="minor">
+            <a:schemeClr val="tx1"/>
+          </a:fontRef>
+        </p:style>
+      </p:cxnSp>
+      <p:cxnSp>
+        <p:nvCxnSpPr>
+          <p:cNvPr id="64" name="직선 연결선 63">
+            <a:extLst>
+              <a:ext uri="{FF2B5EF4-FFF2-40B4-BE49-F238E27FC236}">
+                <a16:creationId xmlns:a16="http://schemas.microsoft.com/office/drawing/2014/main" id="{D7A00C3E-6A23-47EB-8AF8-A02A52E3715E}"/>
+              </a:ext>
+            </a:extLst>
+          </p:cNvPr>
+          <p:cNvCxnSpPr>
+            <a:cxnSpLocks/>
+          </p:cNvCxnSpPr>
+          <p:nvPr/>
+        </p:nvCxnSpPr>
+        <p:spPr>
+          <a:xfrm>
+            <a:off x="4631978" y="1157681"/>
+            <a:ext cx="0" cy="3670619"/>
+          </a:xfrm>
+          <a:prstGeom prst="line">
+            <a:avLst/>
+          </a:prstGeom>
+          <a:ln w="9525" cap="flat" cmpd="sng" algn="ctr">
+            <a:solidFill>
+              <a:schemeClr val="dk1"/>
+            </a:solidFill>
+            <a:prstDash val="dash"/>
+            <a:round/>
+            <a:headEnd type="none" w="med" len="med"/>
+            <a:tailEnd type="none" w="med" len="med"/>
+          </a:ln>
+        </p:spPr>
+        <p:style>
+          <a:lnRef idx="0">
+            <a:scrgbClr r="0" g="0" b="0"/>
+          </a:lnRef>
+          <a:fillRef idx="0">
+            <a:scrgbClr r="0" g="0" b="0"/>
+          </a:fillRef>
+          <a:effectRef idx="0">
+            <a:scrgbClr r="0" g="0" b="0"/>
+          </a:effectRef>
+          <a:fontRef idx="minor">
+            <a:schemeClr val="tx1"/>
+          </a:fontRef>
+        </p:style>
+      </p:cxnSp>
+      <p:cxnSp>
+        <p:nvCxnSpPr>
+          <p:cNvPr id="221" name="직선 연결선 220">
+            <a:extLst>
+              <a:ext uri="{FF2B5EF4-FFF2-40B4-BE49-F238E27FC236}">
+                <a16:creationId xmlns:a16="http://schemas.microsoft.com/office/drawing/2014/main" id="{5BB61A78-FDD7-4B88-835D-F01076253E2A}"/>
+              </a:ext>
+            </a:extLst>
+          </p:cNvPr>
+          <p:cNvCxnSpPr>
+            <a:cxnSpLocks/>
+          </p:cNvCxnSpPr>
+          <p:nvPr/>
+        </p:nvCxnSpPr>
+        <p:spPr>
+          <a:xfrm>
+            <a:off x="4757583" y="2031692"/>
+            <a:ext cx="0" cy="3670619"/>
+          </a:xfrm>
+          <a:prstGeom prst="line">
+            <a:avLst/>
+          </a:prstGeom>
+          <a:ln w="9525" cap="flat" cmpd="sng" algn="ctr">
+            <a:solidFill>
+              <a:schemeClr val="dk1"/>
+            </a:solidFill>
+            <a:prstDash val="dash"/>
+            <a:round/>
+            <a:headEnd type="none" w="med" len="med"/>
+            <a:tailEnd type="none" w="med" len="med"/>
+          </a:ln>
+        </p:spPr>
+        <p:style>
+          <a:lnRef idx="0">
+            <a:scrgbClr r="0" g="0" b="0"/>
+          </a:lnRef>
+          <a:fillRef idx="0">
+            <a:scrgbClr r="0" g="0" b="0"/>
+          </a:fillRef>
+          <a:effectRef idx="0">
+            <a:scrgbClr r="0" g="0" b="0"/>
+          </a:effectRef>
+          <a:fontRef idx="minor">
+            <a:schemeClr val="tx1"/>
+          </a:fontRef>
+        </p:style>
+      </p:cxnSp>
+      <p:cxnSp>
+        <p:nvCxnSpPr>
+          <p:cNvPr id="222" name="직선 연결선 221">
+            <a:extLst>
+              <a:ext uri="{FF2B5EF4-FFF2-40B4-BE49-F238E27FC236}">
+                <a16:creationId xmlns:a16="http://schemas.microsoft.com/office/drawing/2014/main" id="{D90F379E-8741-4455-A0A1-9B7DCFAFFBD7}"/>
+              </a:ext>
+            </a:extLst>
+          </p:cNvPr>
+          <p:cNvCxnSpPr>
+            <a:cxnSpLocks/>
+          </p:cNvCxnSpPr>
+          <p:nvPr/>
+        </p:nvCxnSpPr>
+        <p:spPr>
+          <a:xfrm>
+            <a:off x="5946867" y="1543412"/>
+            <a:ext cx="0" cy="3670619"/>
+          </a:xfrm>
+          <a:prstGeom prst="line">
+            <a:avLst/>
+          </a:prstGeom>
+          <a:ln w="9525" cap="flat" cmpd="sng" algn="ctr">
+            <a:solidFill>
+              <a:schemeClr val="dk1"/>
+            </a:solidFill>
+            <a:prstDash val="dash"/>
+            <a:round/>
+            <a:headEnd type="none" w="med" len="med"/>
+            <a:tailEnd type="none" w="med" len="med"/>
+          </a:ln>
+        </p:spPr>
+        <p:style>
+          <a:lnRef idx="0">
+            <a:scrgbClr r="0" g="0" b="0"/>
+          </a:lnRef>
+          <a:fillRef idx="0">
+            <a:scrgbClr r="0" g="0" b="0"/>
+          </a:fillRef>
+          <a:effectRef idx="0">
+            <a:scrgbClr r="0" g="0" b="0"/>
+          </a:effectRef>
+          <a:fontRef idx="minor">
+            <a:schemeClr val="tx1"/>
+          </a:fontRef>
+        </p:style>
+      </p:cxnSp>
+      <p:sp>
+        <p:nvSpPr>
+          <p:cNvPr id="223" name="TextBox 222">
+            <a:extLst>
+              <a:ext uri="{FF2B5EF4-FFF2-40B4-BE49-F238E27FC236}">
+                <a16:creationId xmlns:a16="http://schemas.microsoft.com/office/drawing/2014/main" id="{10A293CB-3777-4CCE-BFBA-5B0C39DBF9FC}"/>
+              </a:ext>
+            </a:extLst>
+          </p:cNvPr>
+          <p:cNvSpPr txBox="1"/>
+          <p:nvPr/>
+        </p:nvSpPr>
+        <p:spPr>
+          <a:xfrm>
+            <a:off x="4991061" y="1060241"/>
+            <a:ext cx="1716689" cy="369332"/>
+          </a:xfrm>
+          <a:prstGeom prst="rect">
+            <a:avLst/>
+          </a:prstGeom>
+          <a:noFill/>
+          <a:ln>
+            <a:solidFill>
+              <a:schemeClr val="tx1"/>
+            </a:solidFill>
+          </a:ln>
+        </p:spPr>
+        <p:txBody>
+          <a:bodyPr wrap="square" rtlCol="0">
+            <a:spAutoFit/>
+          </a:bodyPr>
+          <a:lstStyle/>
+          <a:p>
+            <a:pPr algn="ctr"/>
+            <a:r>
+              <a:rPr lang="ko-KR" altLang="en-US" dirty="0"/>
+              <a:t>변경 모델링</a:t>
+            </a:r>
+          </a:p>
+        </p:txBody>
+      </p:sp>
+    </p:spTree>
+    <p:extLst>
+      <p:ext uri="{BB962C8B-B14F-4D97-AF65-F5344CB8AC3E}">
+        <p14:creationId xmlns:p14="http://schemas.microsoft.com/office/powerpoint/2010/main" val="2255721362"/>
+      </p:ext>
+    </p:extLst>
+  </p:cSld>
+  <p:clrMapOvr>
+    <a:masterClrMapping/>
+  </p:clrMapOvr>
+</p:sld>
+</file>
+
+<file path=ppt/slides/slide11.xml><?xml version="1.0" encoding="utf-8"?>
+<p:sld xmlns:a="http://schemas.openxmlformats.org/drawingml/2006/main" xmlns:r="http://schemas.openxmlformats.org/officeDocument/2006/relationships" xmlns:p="http://schemas.openxmlformats.org/presentationml/2006/main">
+  <p:cSld>
+    <p:spTree>
+      <p:nvGrpSpPr>
+        <p:cNvPr id="1" name=""/>
+        <p:cNvGrpSpPr/>
+        <p:nvPr/>
+      </p:nvGrpSpPr>
+      <p:grpSpPr>
+        <a:xfrm>
+          <a:off x="0" y="0"/>
+          <a:ext cx="0" cy="0"/>
+          <a:chOff x="0" y="0"/>
+          <a:chExt cx="0" cy="0"/>
+        </a:xfrm>
+      </p:grpSpPr>
+      <p:sp>
+        <p:nvSpPr>
+          <p:cNvPr id="6" name="직사각형 5"/>
+          <p:cNvSpPr/>
+          <p:nvPr/>
+        </p:nvSpPr>
+        <p:spPr>
+          <a:xfrm>
+            <a:off x="1438183" y="0"/>
+            <a:ext cx="10753817" cy="825623"/>
+          </a:xfrm>
+          <a:prstGeom prst="rect">
+            <a:avLst/>
+          </a:prstGeom>
+          <a:solidFill>
+            <a:srgbClr val="F1F3F5"/>
+          </a:solidFill>
+          <a:ln>
+            <a:solidFill>
+              <a:schemeClr val="bg1">
+                <a:lumMod val="85000"/>
+              </a:schemeClr>
+            </a:solidFill>
+          </a:ln>
+        </p:spPr>
+        <p:style>
+          <a:lnRef idx="2">
+            <a:schemeClr val="accent1">
+              <a:shade val="50000"/>
+            </a:schemeClr>
+          </a:lnRef>
+          <a:fillRef idx="1">
+            <a:schemeClr val="accent1"/>
+          </a:fillRef>
+          <a:effectRef idx="0">
+            <a:schemeClr val="accent1"/>
+          </a:effectRef>
+          <a:fontRef idx="minor">
+            <a:schemeClr val="lt1"/>
+          </a:fontRef>
+        </p:style>
+        <p:txBody>
+          <a:bodyPr rtlCol="0" anchor="ctr"/>
+          <a:lstStyle/>
+          <a:p>
+            <a:pPr algn="ctr"/>
+            <a:endParaRPr lang="ko-KR" altLang="en-US">
+              <a:latin typeface="+mj-lt"/>
+            </a:endParaRPr>
+          </a:p>
+        </p:txBody>
+      </p:sp>
+      <p:sp>
+        <p:nvSpPr>
+          <p:cNvPr id="5" name="직사각형 4"/>
+          <p:cNvSpPr/>
+          <p:nvPr/>
+        </p:nvSpPr>
+        <p:spPr>
+          <a:xfrm>
+            <a:off x="0" y="0"/>
+            <a:ext cx="1642369" cy="6858000"/>
+          </a:xfrm>
+          <a:prstGeom prst="rect">
+            <a:avLst/>
+          </a:prstGeom>
+          <a:solidFill>
+            <a:srgbClr val="2A333C"/>
+          </a:solidFill>
+          <a:ln>
+            <a:noFill/>
+          </a:ln>
+        </p:spPr>
+        <p:style>
+          <a:lnRef idx="2">
+            <a:schemeClr val="accent1">
+              <a:shade val="50000"/>
+            </a:schemeClr>
+          </a:lnRef>
+          <a:fillRef idx="1">
+            <a:schemeClr val="accent1"/>
+          </a:fillRef>
+          <a:effectRef idx="0">
+            <a:schemeClr val="accent1"/>
+          </a:effectRef>
+          <a:fontRef idx="minor">
+            <a:schemeClr val="lt1"/>
+          </a:fontRef>
+        </p:style>
+        <p:txBody>
+          <a:bodyPr rtlCol="0" anchor="ctr"/>
+          <a:lstStyle/>
+          <a:p>
+            <a:pPr algn="ctr"/>
+            <a:endParaRPr lang="ko-KR" altLang="en-US" dirty="0">
+              <a:latin typeface="+mj-lt"/>
+            </a:endParaRPr>
+          </a:p>
+        </p:txBody>
+      </p:sp>
+      <p:sp>
+        <p:nvSpPr>
+          <p:cNvPr id="9" name="직사각형 8"/>
+          <p:cNvSpPr/>
+          <p:nvPr/>
+        </p:nvSpPr>
+        <p:spPr>
+          <a:xfrm>
+            <a:off x="0" y="0"/>
+            <a:ext cx="1642369" cy="825623"/>
+          </a:xfrm>
+          <a:prstGeom prst="rect">
+            <a:avLst/>
+          </a:prstGeom>
+          <a:solidFill>
+            <a:srgbClr val="3E4B58"/>
+          </a:solidFill>
+          <a:ln>
+            <a:noFill/>
+          </a:ln>
+        </p:spPr>
+        <p:style>
+          <a:lnRef idx="2">
+            <a:schemeClr val="accent1">
+              <a:shade val="50000"/>
+            </a:schemeClr>
+          </a:lnRef>
+          <a:fillRef idx="1">
+            <a:schemeClr val="accent1"/>
+          </a:fillRef>
+          <a:effectRef idx="0">
+            <a:schemeClr val="accent1"/>
+          </a:effectRef>
+          <a:fontRef idx="minor">
+            <a:schemeClr val="lt1"/>
+          </a:fontRef>
+        </p:style>
+        <p:txBody>
+          <a:bodyPr rtlCol="0" anchor="ctr"/>
+          <a:lstStyle/>
+          <a:p>
+            <a:pPr algn="ctr"/>
+            <a:endParaRPr lang="ko-KR" altLang="en-US">
+              <a:latin typeface="+mj-lt"/>
+            </a:endParaRPr>
+          </a:p>
+        </p:txBody>
+      </p:sp>
+      <p:cxnSp>
+        <p:nvCxnSpPr>
+          <p:cNvPr id="15" name="직선 연결선 14"/>
+          <p:cNvCxnSpPr/>
+          <p:nvPr/>
+        </p:nvCxnSpPr>
+        <p:spPr>
+          <a:xfrm>
+            <a:off x="204186" y="1997910"/>
+            <a:ext cx="1162975" cy="0"/>
+          </a:xfrm>
+          <a:prstGeom prst="line">
+            <a:avLst/>
+          </a:prstGeom>
+          <a:ln w="19050">
+            <a:solidFill>
+              <a:schemeClr val="bg1"/>
+            </a:solidFill>
+          </a:ln>
+        </p:spPr>
+        <p:style>
+          <a:lnRef idx="1">
+            <a:schemeClr val="accent1"/>
+          </a:lnRef>
+          <a:fillRef idx="0">
+            <a:schemeClr val="accent1"/>
+          </a:fillRef>
+          <a:effectRef idx="0">
+            <a:schemeClr val="accent1"/>
+          </a:effectRef>
+          <a:fontRef idx="minor">
+            <a:schemeClr val="tx1"/>
+          </a:fontRef>
+        </p:style>
+      </p:cxnSp>
+      <p:cxnSp>
+        <p:nvCxnSpPr>
+          <p:cNvPr id="17" name="직선 연결선 16"/>
+          <p:cNvCxnSpPr/>
+          <p:nvPr/>
+        </p:nvCxnSpPr>
+        <p:spPr>
+          <a:xfrm>
+            <a:off x="204186" y="2876799"/>
+            <a:ext cx="1162975" cy="0"/>
+          </a:xfrm>
+          <a:prstGeom prst="line">
+            <a:avLst/>
+          </a:prstGeom>
+          <a:ln w="12700">
+            <a:solidFill>
+              <a:schemeClr val="bg1"/>
+            </a:solidFill>
+          </a:ln>
+        </p:spPr>
+        <p:style>
+          <a:lnRef idx="1">
+            <a:schemeClr val="accent1"/>
+          </a:lnRef>
+          <a:fillRef idx="0">
+            <a:schemeClr val="accent1"/>
+          </a:fillRef>
+          <a:effectRef idx="0">
+            <a:schemeClr val="accent1"/>
+          </a:effectRef>
+          <a:fontRef idx="minor">
+            <a:schemeClr val="tx1"/>
+          </a:fontRef>
+        </p:style>
+      </p:cxnSp>
+      <p:grpSp>
+        <p:nvGrpSpPr>
+          <p:cNvPr id="3" name="그룹 2">
+            <a:extLst>
+              <a:ext uri="{FF2B5EF4-FFF2-40B4-BE49-F238E27FC236}">
+                <a16:creationId xmlns:a16="http://schemas.microsoft.com/office/drawing/2014/main" id="{4511C819-416E-4D5E-ADCE-A7E154739B72}"/>
+              </a:ext>
+            </a:extLst>
+          </p:cNvPr>
+          <p:cNvGrpSpPr/>
+          <p:nvPr/>
+        </p:nvGrpSpPr>
+        <p:grpSpPr>
+          <a:xfrm>
+            <a:off x="410695" y="3114629"/>
+            <a:ext cx="483687" cy="591653"/>
+            <a:chOff x="410695" y="3114629"/>
+            <a:chExt cx="483687" cy="591653"/>
+          </a:xfrm>
+        </p:grpSpPr>
+        <p:sp>
+          <p:nvSpPr>
+            <p:cNvPr id="25" name="TextBox 24"/>
+            <p:cNvSpPr txBox="1"/>
+            <p:nvPr/>
+          </p:nvSpPr>
+          <p:spPr>
+            <a:xfrm>
+              <a:off x="410695" y="3444672"/>
+              <a:ext cx="184731" cy="261610"/>
+            </a:xfrm>
+            <a:prstGeom prst="rect">
+              <a:avLst/>
+            </a:prstGeom>
+            <a:noFill/>
+          </p:spPr>
+          <p:txBody>
+            <a:bodyPr wrap="none" rtlCol="0">
+              <a:spAutoFit/>
+            </a:bodyPr>
+            <a:lstStyle/>
+            <a:p>
+              <a:endParaRPr lang="ko-KR" altLang="en-US" sz="1100" dirty="0">
+                <a:ln>
+                  <a:solidFill>
+                    <a:schemeClr val="bg1">
+                      <a:alpha val="0"/>
+                    </a:schemeClr>
+                  </a:solidFill>
+                </a:ln>
+                <a:solidFill>
+                  <a:srgbClr val="BFBFBF"/>
+                </a:solidFill>
+                <a:latin typeface="+mj-lt"/>
+                <a:ea typeface="08서울남산체 B" panose="02020603020101020101" pitchFamily="18" charset="-127"/>
+              </a:endParaRPr>
+            </a:p>
+          </p:txBody>
+        </p:sp>
+        <p:sp>
+          <p:nvSpPr>
+            <p:cNvPr id="21" name="TextBox 20"/>
+            <p:cNvSpPr txBox="1"/>
+            <p:nvPr/>
+          </p:nvSpPr>
+          <p:spPr>
+            <a:xfrm>
+              <a:off x="709651" y="3114629"/>
+              <a:ext cx="184731" cy="261610"/>
+            </a:xfrm>
+            <a:prstGeom prst="rect">
+              <a:avLst/>
+            </a:prstGeom>
+            <a:noFill/>
+          </p:spPr>
+          <p:txBody>
+            <a:bodyPr wrap="none" rtlCol="0">
+              <a:spAutoFit/>
+            </a:bodyPr>
+            <a:lstStyle/>
+            <a:p>
+              <a:endParaRPr lang="ko-KR" altLang="en-US" sz="1100" dirty="0">
+                <a:ln>
+                  <a:solidFill>
+                    <a:schemeClr val="bg1">
+                      <a:alpha val="0"/>
+                    </a:schemeClr>
+                  </a:solidFill>
+                </a:ln>
+                <a:solidFill>
+                  <a:schemeClr val="bg1"/>
+                </a:solidFill>
+                <a:latin typeface="+mj-lt"/>
+                <a:ea typeface="08서울남산체 B" panose="02020603020101020101" pitchFamily="18" charset="-127"/>
+              </a:endParaRPr>
+            </a:p>
+          </p:txBody>
+        </p:sp>
+      </p:grpSp>
+      <p:grpSp>
+        <p:nvGrpSpPr>
+          <p:cNvPr id="11" name="그룹 10">
+            <a:extLst>
+              <a:ext uri="{FF2B5EF4-FFF2-40B4-BE49-F238E27FC236}">
+                <a16:creationId xmlns:a16="http://schemas.microsoft.com/office/drawing/2014/main" id="{0DF87528-33D9-4E19-8B44-1FD9F9C7BBDE}"/>
+              </a:ext>
+            </a:extLst>
+          </p:cNvPr>
+          <p:cNvGrpSpPr/>
+          <p:nvPr/>
+        </p:nvGrpSpPr>
+        <p:grpSpPr>
+          <a:xfrm>
+            <a:off x="3273" y="3822537"/>
+            <a:ext cx="1642365" cy="390786"/>
+            <a:chOff x="1" y="3038214"/>
+            <a:chExt cx="1642365" cy="390786"/>
+          </a:xfrm>
+        </p:grpSpPr>
+        <p:sp>
+          <p:nvSpPr>
+            <p:cNvPr id="32" name="직사각형 31"/>
+            <p:cNvSpPr/>
+            <p:nvPr/>
+          </p:nvSpPr>
+          <p:spPr>
+            <a:xfrm>
+              <a:off x="1" y="3038214"/>
+              <a:ext cx="1627082" cy="390786"/>
+            </a:xfrm>
+            <a:prstGeom prst="rect">
+              <a:avLst/>
+            </a:prstGeom>
+            <a:solidFill>
+              <a:schemeClr val="bg1">
+                <a:alpha val="24000"/>
+              </a:schemeClr>
+            </a:solidFill>
+            <a:ln>
+              <a:noFill/>
+            </a:ln>
+          </p:spPr>
+          <p:style>
+            <a:lnRef idx="2">
+              <a:schemeClr val="accent1">
+                <a:shade val="50000"/>
+              </a:schemeClr>
+            </a:lnRef>
+            <a:fillRef idx="1">
+              <a:schemeClr val="accent1"/>
+            </a:fillRef>
+            <a:effectRef idx="0">
+              <a:schemeClr val="accent1"/>
+            </a:effectRef>
+            <a:fontRef idx="minor">
+              <a:schemeClr val="lt1"/>
+            </a:fontRef>
+          </p:style>
+          <p:txBody>
+            <a:bodyPr rtlCol="0" anchor="ctr"/>
+            <a:lstStyle/>
+            <a:p>
+              <a:pPr algn="ctr"/>
+              <a:endParaRPr lang="ko-KR" altLang="en-US">
+                <a:latin typeface="+mj-lt"/>
+              </a:endParaRPr>
+            </a:p>
+          </p:txBody>
+        </p:sp>
+        <p:sp>
+          <p:nvSpPr>
+            <p:cNvPr id="33" name="직사각형 32"/>
+            <p:cNvSpPr/>
+            <p:nvPr/>
+          </p:nvSpPr>
+          <p:spPr>
+            <a:xfrm>
+              <a:off x="1571347" y="3038214"/>
+              <a:ext cx="71019" cy="390786"/>
+            </a:xfrm>
+            <a:prstGeom prst="rect">
+              <a:avLst/>
+            </a:prstGeom>
+            <a:solidFill>
+              <a:srgbClr val="DE0964"/>
+            </a:solidFill>
+            <a:ln>
+              <a:noFill/>
+            </a:ln>
+          </p:spPr>
+          <p:style>
+            <a:lnRef idx="2">
+              <a:schemeClr val="accent1">
+                <a:shade val="50000"/>
+              </a:schemeClr>
+            </a:lnRef>
+            <a:fillRef idx="1">
+              <a:schemeClr val="accent1"/>
+            </a:fillRef>
+            <a:effectRef idx="0">
+              <a:schemeClr val="accent1"/>
+            </a:effectRef>
+            <a:fontRef idx="minor">
+              <a:schemeClr val="lt1"/>
+            </a:fontRef>
+          </p:style>
+          <p:txBody>
+            <a:bodyPr rtlCol="0" anchor="ctr"/>
+            <a:lstStyle/>
+            <a:p>
+              <a:pPr algn="ctr"/>
+              <a:endParaRPr lang="ko-KR" altLang="en-US">
+                <a:solidFill>
+                  <a:srgbClr val="3399FF"/>
+                </a:solidFill>
+                <a:latin typeface="+mj-lt"/>
+              </a:endParaRPr>
+            </a:p>
+          </p:txBody>
+        </p:sp>
+      </p:grpSp>
+      <p:grpSp>
+        <p:nvGrpSpPr>
+          <p:cNvPr id="98" name="그룹 97">
+            <a:extLst>
+              <a:ext uri="{FF2B5EF4-FFF2-40B4-BE49-F238E27FC236}">
+                <a16:creationId xmlns:a16="http://schemas.microsoft.com/office/drawing/2014/main" id="{EB95938E-A3C8-49E1-A1AA-65E1980CBFB7}"/>
+              </a:ext>
+            </a:extLst>
+          </p:cNvPr>
+          <p:cNvGrpSpPr/>
+          <p:nvPr/>
+        </p:nvGrpSpPr>
+        <p:grpSpPr>
+          <a:xfrm>
+            <a:off x="1707484" y="54274"/>
+            <a:ext cx="1601721" cy="636057"/>
+            <a:chOff x="1707484" y="54274"/>
+            <a:chExt cx="1601721" cy="636057"/>
+          </a:xfrm>
+        </p:grpSpPr>
+        <p:sp>
+          <p:nvSpPr>
+            <p:cNvPr id="115" name="직사각형 114">
+              <a:extLst>
+                <a:ext uri="{FF2B5EF4-FFF2-40B4-BE49-F238E27FC236}">
+                  <a16:creationId xmlns:a16="http://schemas.microsoft.com/office/drawing/2014/main" id="{BFB21557-5684-446E-B80F-55541C86B52B}"/>
+                </a:ext>
+              </a:extLst>
+            </p:cNvPr>
+            <p:cNvSpPr/>
+            <p:nvPr/>
+          </p:nvSpPr>
+          <p:spPr>
+            <a:xfrm>
+              <a:off x="1707484" y="54274"/>
+              <a:ext cx="1601721" cy="400110"/>
+            </a:xfrm>
+            <a:prstGeom prst="rect">
+              <a:avLst/>
+            </a:prstGeom>
+          </p:spPr>
+          <p:txBody>
+            <a:bodyPr wrap="none">
+              <a:spAutoFit/>
+            </a:bodyPr>
+            <a:lstStyle/>
+            <a:p>
+              <a:r>
+                <a:rPr lang="en-US" altLang="ko-KR" sz="2000" spc="300" dirty="0">
+                  <a:latin typeface="+mj-lt"/>
+                </a:rPr>
+                <a:t>Modeling</a:t>
+              </a:r>
+              <a:endParaRPr lang="ko-KR" altLang="en-US" sz="2000" spc="300" dirty="0">
+                <a:latin typeface="+mj-lt"/>
+              </a:endParaRPr>
+            </a:p>
+          </p:txBody>
+        </p:sp>
+        <p:sp>
+          <p:nvSpPr>
+            <p:cNvPr id="116" name="직사각형 115">
+              <a:extLst>
+                <a:ext uri="{FF2B5EF4-FFF2-40B4-BE49-F238E27FC236}">
+                  <a16:creationId xmlns:a16="http://schemas.microsoft.com/office/drawing/2014/main" id="{86A073C7-ED9C-4DD6-B965-6F907E568119}"/>
+                </a:ext>
+              </a:extLst>
+            </p:cNvPr>
+            <p:cNvSpPr/>
+            <p:nvPr/>
+          </p:nvSpPr>
+          <p:spPr>
+            <a:xfrm>
+              <a:off x="1707484" y="382554"/>
+              <a:ext cx="583814" cy="307777"/>
+            </a:xfrm>
+            <a:prstGeom prst="rect">
+              <a:avLst/>
+            </a:prstGeom>
+          </p:spPr>
+          <p:txBody>
+            <a:bodyPr wrap="none">
+              <a:spAutoFit/>
+            </a:bodyPr>
+            <a:lstStyle/>
+            <a:p>
+              <a:r>
+                <a:rPr lang="en-US" altLang="ko-KR" sz="1400" spc="-150" dirty="0">
+                  <a:latin typeface="+mj-lt"/>
+                </a:rPr>
+                <a:t>Graph</a:t>
+              </a:r>
+              <a:endParaRPr lang="ko-KR" altLang="en-US" sz="1400" spc="-150" dirty="0">
+                <a:latin typeface="+mj-lt"/>
+              </a:endParaRPr>
+            </a:p>
+          </p:txBody>
+        </p:sp>
+      </p:grpSp>
+      <p:sp>
+        <p:nvSpPr>
+          <p:cNvPr id="119" name="직사각형 118">
+            <a:extLst>
+              <a:ext uri="{FF2B5EF4-FFF2-40B4-BE49-F238E27FC236}">
+                <a16:creationId xmlns:a16="http://schemas.microsoft.com/office/drawing/2014/main" id="{8756C9F6-69D5-44EE-A4E3-1BA6BAC1C094}"/>
+              </a:ext>
+            </a:extLst>
+          </p:cNvPr>
+          <p:cNvSpPr/>
+          <p:nvPr/>
+        </p:nvSpPr>
+        <p:spPr>
+          <a:xfrm>
+            <a:off x="181638" y="2263655"/>
+            <a:ext cx="1237839" cy="369332"/>
+          </a:xfrm>
+          <a:prstGeom prst="rect">
+            <a:avLst/>
+          </a:prstGeom>
+        </p:spPr>
+        <p:txBody>
+          <a:bodyPr wrap="none">
+            <a:spAutoFit/>
+          </a:bodyPr>
+          <a:lstStyle/>
+          <a:p>
+            <a:r>
+              <a:rPr lang="en-US" altLang="ko-KR" dirty="0" err="1">
+                <a:solidFill>
+                  <a:schemeClr val="bg1"/>
+                </a:solidFill>
+                <a:latin typeface="+mn-ea"/>
+              </a:rPr>
+              <a:t>Modieling</a:t>
+            </a:r>
+            <a:endParaRPr lang="en-US" altLang="ko-KR" dirty="0">
+              <a:solidFill>
+                <a:schemeClr val="bg1"/>
+              </a:solidFill>
+              <a:latin typeface="+mn-ea"/>
+            </a:endParaRPr>
+          </a:p>
+        </p:txBody>
+      </p:sp>
+      <p:sp>
+        <p:nvSpPr>
+          <p:cNvPr id="121" name="직사각형 120">
+            <a:extLst>
+              <a:ext uri="{FF2B5EF4-FFF2-40B4-BE49-F238E27FC236}">
+                <a16:creationId xmlns:a16="http://schemas.microsoft.com/office/drawing/2014/main" id="{1A8757D7-4878-41C8-8B7D-81CE6EDC0E0C}"/>
+              </a:ext>
+            </a:extLst>
+          </p:cNvPr>
+          <p:cNvSpPr/>
+          <p:nvPr/>
+        </p:nvSpPr>
+        <p:spPr>
+          <a:xfrm>
+            <a:off x="9171" y="3514513"/>
+            <a:ext cx="1585690" cy="230832"/>
+          </a:xfrm>
+          <a:prstGeom prst="rect">
+            <a:avLst/>
+          </a:prstGeom>
+        </p:spPr>
+        <p:txBody>
+          <a:bodyPr wrap="none">
+            <a:spAutoFit/>
+          </a:bodyPr>
+          <a:lstStyle/>
+          <a:p>
+            <a:r>
+              <a:rPr lang="en-US" altLang="ko-KR" sz="900" dirty="0">
+                <a:solidFill>
+                  <a:srgbClr val="BFBFBF"/>
+                </a:solidFill>
+                <a:latin typeface="+mj-lt"/>
+              </a:rPr>
+              <a:t>Development Environment</a:t>
+            </a:r>
+            <a:endParaRPr lang="ko-KR" altLang="en-US" sz="900" dirty="0">
+              <a:solidFill>
+                <a:srgbClr val="BFBFBF"/>
+              </a:solidFill>
+              <a:latin typeface="+mj-lt"/>
+            </a:endParaRPr>
+          </a:p>
+        </p:txBody>
+      </p:sp>
+      <p:sp>
+        <p:nvSpPr>
+          <p:cNvPr id="122" name="직사각형 121">
+            <a:extLst>
+              <a:ext uri="{FF2B5EF4-FFF2-40B4-BE49-F238E27FC236}">
+                <a16:creationId xmlns:a16="http://schemas.microsoft.com/office/drawing/2014/main" id="{B878B25E-4D08-4970-98D1-2AA9089670BB}"/>
+              </a:ext>
+            </a:extLst>
+          </p:cNvPr>
+          <p:cNvSpPr/>
+          <p:nvPr/>
+        </p:nvSpPr>
+        <p:spPr>
+          <a:xfrm>
+            <a:off x="916111" y="3086121"/>
+            <a:ext cx="633507" cy="253916"/>
+          </a:xfrm>
+          <a:prstGeom prst="rect">
+            <a:avLst/>
+          </a:prstGeom>
+        </p:spPr>
+        <p:txBody>
+          <a:bodyPr wrap="none">
+            <a:spAutoFit/>
+          </a:bodyPr>
+          <a:lstStyle/>
+          <a:p>
+            <a:r>
+              <a:rPr lang="en-US" altLang="ko-KR" sz="1050" dirty="0">
+                <a:solidFill>
+                  <a:srgbClr val="BFBFBF"/>
+                </a:solidFill>
+                <a:latin typeface="+mj-lt"/>
+              </a:rPr>
+              <a:t>Subject</a:t>
+            </a:r>
+            <a:endParaRPr lang="ko-KR" altLang="en-US" sz="1050" dirty="0">
+              <a:solidFill>
+                <a:srgbClr val="BFBFBF"/>
+              </a:solidFill>
+              <a:latin typeface="+mj-lt"/>
+            </a:endParaRPr>
+          </a:p>
+        </p:txBody>
+      </p:sp>
+      <p:sp>
+        <p:nvSpPr>
+          <p:cNvPr id="88" name="직사각형 87">
+            <a:extLst>
+              <a:ext uri="{FF2B5EF4-FFF2-40B4-BE49-F238E27FC236}">
+                <a16:creationId xmlns:a16="http://schemas.microsoft.com/office/drawing/2014/main" id="{9F014737-3DA4-45B2-8562-3651CF2E7895}"/>
+              </a:ext>
+            </a:extLst>
+          </p:cNvPr>
+          <p:cNvSpPr/>
+          <p:nvPr/>
+        </p:nvSpPr>
+        <p:spPr>
+          <a:xfrm>
+            <a:off x="800558" y="3878951"/>
+            <a:ext cx="769763" cy="253916"/>
+          </a:xfrm>
+          <a:prstGeom prst="rect">
+            <a:avLst/>
+          </a:prstGeom>
+        </p:spPr>
+        <p:txBody>
+          <a:bodyPr wrap="none">
+            <a:spAutoFit/>
+          </a:bodyPr>
+          <a:lstStyle/>
+          <a:p>
+            <a:r>
+              <a:rPr lang="en-US" altLang="ko-KR" sz="1050" dirty="0">
+                <a:solidFill>
+                  <a:schemeClr val="bg1"/>
+                </a:solidFill>
+                <a:latin typeface="+mj-lt"/>
+              </a:rPr>
+              <a:t>Modeling</a:t>
+            </a:r>
+            <a:endParaRPr lang="ko-KR" altLang="en-US" sz="1050" dirty="0">
+              <a:solidFill>
+                <a:schemeClr val="bg1"/>
+              </a:solidFill>
+              <a:latin typeface="+mj-lt"/>
+            </a:endParaRPr>
+          </a:p>
+        </p:txBody>
+      </p:sp>
+      <p:sp>
+        <p:nvSpPr>
+          <p:cNvPr id="90" name="직사각형 89">
+            <a:extLst>
+              <a:ext uri="{FF2B5EF4-FFF2-40B4-BE49-F238E27FC236}">
+                <a16:creationId xmlns:a16="http://schemas.microsoft.com/office/drawing/2014/main" id="{5245C42A-909D-48A0-A666-D31D3E64703C}"/>
+              </a:ext>
+            </a:extLst>
+          </p:cNvPr>
+          <p:cNvSpPr/>
+          <p:nvPr/>
+        </p:nvSpPr>
+        <p:spPr>
+          <a:xfrm>
+            <a:off x="941903" y="4653846"/>
+            <a:ext cx="583814" cy="253916"/>
+          </a:xfrm>
+          <a:prstGeom prst="rect">
+            <a:avLst/>
+          </a:prstGeom>
+        </p:spPr>
+        <p:txBody>
+          <a:bodyPr wrap="none">
+            <a:spAutoFit/>
+          </a:bodyPr>
+          <a:lstStyle/>
+          <a:p>
+            <a:r>
+              <a:rPr lang="en-US" altLang="ko-KR" sz="1050" dirty="0">
+                <a:solidFill>
+                  <a:srgbClr val="BFBFBF"/>
+                </a:solidFill>
+                <a:latin typeface="+mj-lt"/>
+              </a:rPr>
+              <a:t>Q &amp; A</a:t>
+            </a:r>
+            <a:endParaRPr lang="ko-KR" altLang="en-US" sz="1050" dirty="0">
+              <a:solidFill>
+                <a:srgbClr val="BFBFBF"/>
+              </a:solidFill>
+              <a:latin typeface="+mj-lt"/>
+            </a:endParaRPr>
+          </a:p>
+        </p:txBody>
+      </p:sp>
+      <p:sp>
+        <p:nvSpPr>
           <p:cNvPr id="72" name="직사각형 71">
             <a:extLst>
               <a:ext uri="{FF2B5EF4-FFF2-40B4-BE49-F238E27FC236}">
@@ -6996,7 +11541,7 @@
 </p:sld>
 </file>
 
-<file path=ppt/slides/slide11.xml><?xml version="1.0" encoding="utf-8"?>
+<file path=ppt/slides/slide12.xml><?xml version="1.0" encoding="utf-8"?>
 <p:sld xmlns:a="http://schemas.openxmlformats.org/drawingml/2006/main" xmlns:r="http://schemas.openxmlformats.org/officeDocument/2006/relationships" xmlns:p="http://schemas.openxmlformats.org/presentationml/2006/main">
   <p:cSld>
     <p:spTree>
@@ -8183,7 +12728,7 @@
 </p:sld>
 </file>
 
-<file path=ppt/slides/slide12.xml><?xml version="1.0" encoding="utf-8"?>
+<file path=ppt/slides/slide13.xml><?xml version="1.0" encoding="utf-8"?>
 <p:sld xmlns:a="http://schemas.openxmlformats.org/drawingml/2006/main" xmlns:r="http://schemas.openxmlformats.org/officeDocument/2006/relationships" xmlns:p="http://schemas.openxmlformats.org/presentationml/2006/main">
   <p:cSld>
     <p:spTree>
@@ -10044,7 +14589,7 @@
 </p:sld>
 </file>
 
-<file path=ppt/slides/slide13.xml><?xml version="1.0" encoding="utf-8"?>
+<file path=ppt/slides/slide14.xml><?xml version="1.0" encoding="utf-8"?>
 <p:sld xmlns:a="http://schemas.openxmlformats.org/drawingml/2006/main" xmlns:r="http://schemas.openxmlformats.org/officeDocument/2006/relationships" xmlns:p="http://schemas.openxmlformats.org/presentationml/2006/main">
   <p:cSld>
     <p:spTree>
@@ -11313,7 +15858,7 @@
 </p:sld>
 </file>
 
-<file path=ppt/slides/slide14.xml><?xml version="1.0" encoding="utf-8"?>
+<file path=ppt/slides/slide15.xml><?xml version="1.0" encoding="utf-8"?>
 <p:sld xmlns:a="http://schemas.openxmlformats.org/drawingml/2006/main" xmlns:r="http://schemas.openxmlformats.org/officeDocument/2006/relationships" xmlns:p="http://schemas.openxmlformats.org/presentationml/2006/main">
   <p:cSld>
     <p:spTree>
@@ -23573,6 +28118,47 @@
           </a:p>
         </p:txBody>
       </p:sp>
+      <p:sp>
+        <p:nvSpPr>
+          <p:cNvPr id="74" name="TextBox 73">
+            <a:extLst>
+              <a:ext uri="{FF2B5EF4-FFF2-40B4-BE49-F238E27FC236}">
+                <a16:creationId xmlns:a16="http://schemas.microsoft.com/office/drawing/2014/main" id="{73CFD1CE-F717-447E-B174-25A396B12098}"/>
+              </a:ext>
+            </a:extLst>
+          </p:cNvPr>
+          <p:cNvSpPr txBox="1"/>
+          <p:nvPr/>
+        </p:nvSpPr>
+        <p:spPr>
+          <a:xfrm>
+            <a:off x="4911975" y="1263391"/>
+            <a:ext cx="1716689" cy="369332"/>
+          </a:xfrm>
+          <a:prstGeom prst="rect">
+            <a:avLst/>
+          </a:prstGeom>
+          <a:noFill/>
+          <a:ln>
+            <a:solidFill>
+              <a:schemeClr val="tx1"/>
+            </a:solidFill>
+          </a:ln>
+        </p:spPr>
+        <p:txBody>
+          <a:bodyPr wrap="square" rtlCol="0">
+            <a:spAutoFit/>
+          </a:bodyPr>
+          <a:lstStyle/>
+          <a:p>
+            <a:pPr algn="ctr"/>
+            <a:r>
+              <a:rPr lang="ko-KR" altLang="en-US" dirty="0"/>
+              <a:t>기존 모델링</a:t>
+            </a:r>
+          </a:p>
+        </p:txBody>
+      </p:sp>
     </p:spTree>
     <p:extLst>
       <p:ext uri="{BB962C8B-B14F-4D97-AF65-F5344CB8AC3E}">

</xml_diff>